<commit_message>
Ultima atualização e organização dos dados.
Finalização do projeto!
</commit_message>
<xml_diff>
--- a/Artigo e Apresentação/Slide de Apresentação.pptx
+++ b/Artigo e Apresentação/Slide de Apresentação.pptx
@@ -8,21 +8,23 @@
     <p:sldId id="260" r:id="rId2"/>
     <p:sldId id="261" r:id="rId3"/>
     <p:sldId id="262" r:id="rId4"/>
-    <p:sldId id="263" r:id="rId5"/>
-    <p:sldId id="256" r:id="rId6"/>
-    <p:sldId id="257" r:id="rId7"/>
-    <p:sldId id="258" r:id="rId8"/>
-    <p:sldId id="259" r:id="rId9"/>
-    <p:sldId id="265" r:id="rId10"/>
-    <p:sldId id="275" r:id="rId11"/>
-    <p:sldId id="266" r:id="rId12"/>
-    <p:sldId id="267" r:id="rId13"/>
-    <p:sldId id="269" r:id="rId14"/>
-    <p:sldId id="270" r:id="rId15"/>
-    <p:sldId id="268" r:id="rId16"/>
-    <p:sldId id="272" r:id="rId17"/>
-    <p:sldId id="276" r:id="rId18"/>
-    <p:sldId id="274" r:id="rId19"/>
+    <p:sldId id="277" r:id="rId5"/>
+    <p:sldId id="263" r:id="rId6"/>
+    <p:sldId id="256" r:id="rId7"/>
+    <p:sldId id="257" r:id="rId8"/>
+    <p:sldId id="258" r:id="rId9"/>
+    <p:sldId id="259" r:id="rId10"/>
+    <p:sldId id="278" r:id="rId11"/>
+    <p:sldId id="265" r:id="rId12"/>
+    <p:sldId id="275" r:id="rId13"/>
+    <p:sldId id="266" r:id="rId14"/>
+    <p:sldId id="267" r:id="rId15"/>
+    <p:sldId id="269" r:id="rId16"/>
+    <p:sldId id="270" r:id="rId17"/>
+    <p:sldId id="268" r:id="rId18"/>
+    <p:sldId id="272" r:id="rId19"/>
+    <p:sldId id="276" r:id="rId20"/>
+    <p:sldId id="274" r:id="rId21"/>
   </p:sldIdLst>
   <p:sldSz cx="12192000" cy="6858000"/>
   <p:notesSz cx="6858000" cy="9144000"/>
@@ -129,6 +131,10 @@
 </p:presentation>
 </file>
 
+<file path=ppt/revisionInfo.xml><?xml version="1.0" encoding="utf-8"?>
+<p1510:revInfo xmlns:a="http://schemas.openxmlformats.org/drawingml/2006/main" xmlns:r="http://schemas.openxmlformats.org/officeDocument/2006/relationships" xmlns:p1510="http://schemas.microsoft.com/office/powerpoint/2015/10/main"/>
+</file>
+
 <file path=ppt/slideLayouts/slideLayout1.xml><?xml version="1.0" encoding="utf-8"?>
 <p:sldLayout xmlns:a="http://schemas.openxmlformats.org/drawingml/2006/main" xmlns:r="http://schemas.openxmlformats.org/officeDocument/2006/relationships" xmlns:p="http://schemas.openxmlformats.org/presentationml/2006/main" type="title" preserve="1">
   <p:cSld name="Slide de Título">
@@ -276,7 +282,7 @@
           <a:p>
             <a:fld id="{4C062331-25C4-4943-AE23-C2887B941C0C}" type="datetimeFigureOut">
               <a:rPr lang="pt-BR" smtClean="0"/>
-              <a:t>23/07/2017</a:t>
+              <a:t>25/07/2017</a:t>
             </a:fld>
             <a:endParaRPr lang="pt-BR"/>
           </a:p>
@@ -474,7 +480,7 @@
           <a:p>
             <a:fld id="{4C062331-25C4-4943-AE23-C2887B941C0C}" type="datetimeFigureOut">
               <a:rPr lang="pt-BR" smtClean="0"/>
-              <a:t>23/07/2017</a:t>
+              <a:t>25/07/2017</a:t>
             </a:fld>
             <a:endParaRPr lang="pt-BR"/>
           </a:p>
@@ -682,7 +688,7 @@
           <a:p>
             <a:fld id="{4C062331-25C4-4943-AE23-C2887B941C0C}" type="datetimeFigureOut">
               <a:rPr lang="pt-BR" smtClean="0"/>
-              <a:t>23/07/2017</a:t>
+              <a:t>25/07/2017</a:t>
             </a:fld>
             <a:endParaRPr lang="pt-BR"/>
           </a:p>
@@ -880,7 +886,7 @@
           <a:p>
             <a:fld id="{4C062331-25C4-4943-AE23-C2887B941C0C}" type="datetimeFigureOut">
               <a:rPr lang="pt-BR" smtClean="0"/>
-              <a:t>23/07/2017</a:t>
+              <a:t>25/07/2017</a:t>
             </a:fld>
             <a:endParaRPr lang="pt-BR"/>
           </a:p>
@@ -1155,7 +1161,7 @@
           <a:p>
             <a:fld id="{4C062331-25C4-4943-AE23-C2887B941C0C}" type="datetimeFigureOut">
               <a:rPr lang="pt-BR" smtClean="0"/>
-              <a:t>23/07/2017</a:t>
+              <a:t>25/07/2017</a:t>
             </a:fld>
             <a:endParaRPr lang="pt-BR"/>
           </a:p>
@@ -1420,7 +1426,7 @@
           <a:p>
             <a:fld id="{4C062331-25C4-4943-AE23-C2887B941C0C}" type="datetimeFigureOut">
               <a:rPr lang="pt-BR" smtClean="0"/>
-              <a:t>23/07/2017</a:t>
+              <a:t>25/07/2017</a:t>
             </a:fld>
             <a:endParaRPr lang="pt-BR"/>
           </a:p>
@@ -1832,7 +1838,7 @@
           <a:p>
             <a:fld id="{4C062331-25C4-4943-AE23-C2887B941C0C}" type="datetimeFigureOut">
               <a:rPr lang="pt-BR" smtClean="0"/>
-              <a:t>23/07/2017</a:t>
+              <a:t>25/07/2017</a:t>
             </a:fld>
             <a:endParaRPr lang="pt-BR"/>
           </a:p>
@@ -1973,7 +1979,7 @@
           <a:p>
             <a:fld id="{4C062331-25C4-4943-AE23-C2887B941C0C}" type="datetimeFigureOut">
               <a:rPr lang="pt-BR" smtClean="0"/>
-              <a:t>23/07/2017</a:t>
+              <a:t>25/07/2017</a:t>
             </a:fld>
             <a:endParaRPr lang="pt-BR"/>
           </a:p>
@@ -2086,7 +2092,7 @@
           <a:p>
             <a:fld id="{4C062331-25C4-4943-AE23-C2887B941C0C}" type="datetimeFigureOut">
               <a:rPr lang="pt-BR" smtClean="0"/>
-              <a:t>23/07/2017</a:t>
+              <a:t>25/07/2017</a:t>
             </a:fld>
             <a:endParaRPr lang="pt-BR"/>
           </a:p>
@@ -2397,7 +2403,7 @@
           <a:p>
             <a:fld id="{4C062331-25C4-4943-AE23-C2887B941C0C}" type="datetimeFigureOut">
               <a:rPr lang="pt-BR" smtClean="0"/>
-              <a:t>23/07/2017</a:t>
+              <a:t>25/07/2017</a:t>
             </a:fld>
             <a:endParaRPr lang="pt-BR"/>
           </a:p>
@@ -2685,7 +2691,7 @@
           <a:p>
             <a:fld id="{4C062331-25C4-4943-AE23-C2887B941C0C}" type="datetimeFigureOut">
               <a:rPr lang="pt-BR" smtClean="0"/>
-              <a:t>23/07/2017</a:t>
+              <a:t>25/07/2017</a:t>
             </a:fld>
             <a:endParaRPr lang="pt-BR"/>
           </a:p>
@@ -2926,7 +2932,7 @@
           <a:p>
             <a:fld id="{4C062331-25C4-4943-AE23-C2887B941C0C}" type="datetimeFigureOut">
               <a:rPr lang="pt-BR" smtClean="0"/>
-              <a:t>23/07/2017</a:t>
+              <a:t>25/07/2017</a:t>
             </a:fld>
             <a:endParaRPr lang="pt-BR"/>
           </a:p>
@@ -3445,6 +3451,1432 @@
           </a:prstGeom>
         </p:spPr>
       </p:pic>
+      <p:sp>
+        <p:nvSpPr>
+          <p:cNvPr id="13" name="CaixaDeTexto 12">
+            <a:extLst>
+              <a:ext uri="{FF2B5EF4-FFF2-40B4-BE49-F238E27FC236}">
+                <a16:creationId xmlns:a16="http://schemas.microsoft.com/office/drawing/2014/main" id="{AAC7F2BF-F00D-48ED-ABE1-5A414EE16F94}"/>
+              </a:ext>
+            </a:extLst>
+          </p:cNvPr>
+          <p:cNvSpPr txBox="1"/>
+          <p:nvPr/>
+        </p:nvSpPr>
+        <p:spPr>
+          <a:xfrm>
+            <a:off x="-327171" y="266840"/>
+            <a:ext cx="3296874" cy="707886"/>
+          </a:xfrm>
+          <a:prstGeom prst="rect">
+            <a:avLst/>
+          </a:prstGeom>
+          <a:noFill/>
+        </p:spPr>
+        <p:txBody>
+          <a:bodyPr wrap="square" rtlCol="0">
+            <a:spAutoFit/>
+          </a:bodyPr>
+          <a:lstStyle/>
+          <a:p>
+            <a:pPr algn="ctr"/>
+            <a:r>
+              <a:rPr lang="pt-BR" sz="4000" b="1" dirty="0">
+                <a:latin typeface="Roboto Th" pitchFamily="2" charset="0"/>
+                <a:ea typeface="Roboto Th" pitchFamily="2" charset="0"/>
+              </a:rPr>
+              <a:t>Função A*</a:t>
+            </a:r>
+            <a:endParaRPr lang="pt-BR" sz="1000" b="1" dirty="0">
+              <a:latin typeface="Roboto Th" pitchFamily="2" charset="0"/>
+              <a:ea typeface="Roboto Th" pitchFamily="2" charset="0"/>
+            </a:endParaRPr>
+          </a:p>
+        </p:txBody>
+      </p:sp>
+      <p:sp>
+        <p:nvSpPr>
+          <p:cNvPr id="5" name="Retângulo 4">
+            <a:extLst>
+              <a:ext uri="{FF2B5EF4-FFF2-40B4-BE49-F238E27FC236}">
+                <a16:creationId xmlns:a16="http://schemas.microsoft.com/office/drawing/2014/main" id="{BD609149-3BF6-4D8F-9329-61DB444B0DF8}"/>
+              </a:ext>
+            </a:extLst>
+          </p:cNvPr>
+          <p:cNvSpPr/>
+          <p:nvPr/>
+        </p:nvSpPr>
+        <p:spPr>
+          <a:xfrm>
+            <a:off x="2571226" y="1763787"/>
+            <a:ext cx="5964571" cy="1015663"/>
+          </a:xfrm>
+          <a:prstGeom prst="rect">
+            <a:avLst/>
+          </a:prstGeom>
+        </p:spPr>
+        <p:txBody>
+          <a:bodyPr wrap="square">
+            <a:spAutoFit/>
+          </a:bodyPr>
+          <a:lstStyle/>
+          <a:p>
+            <a:pPr algn="ctr"/>
+            <a:r>
+              <a:rPr lang="pt-BR" sz="6000" b="1" dirty="0">
+                <a:effectLst>
+                  <a:outerShdw blurRad="38100" dist="38100" dir="2700000" algn="tl">
+                    <a:srgbClr val="000000">
+                      <a:alpha val="43137"/>
+                    </a:srgbClr>
+                  </a:outerShdw>
+                </a:effectLst>
+                <a:latin typeface="Roboto Th" pitchFamily="2" charset="0"/>
+                <a:ea typeface="Roboto Th" pitchFamily="2" charset="0"/>
+              </a:rPr>
+              <a:t>F(x) = g(x) + h(x)</a:t>
+            </a:r>
+          </a:p>
+        </p:txBody>
+      </p:sp>
+      <p:cxnSp>
+        <p:nvCxnSpPr>
+          <p:cNvPr id="6" name="Conector: Angulado 5">
+            <a:extLst>
+              <a:ext uri="{FF2B5EF4-FFF2-40B4-BE49-F238E27FC236}">
+                <a16:creationId xmlns:a16="http://schemas.microsoft.com/office/drawing/2014/main" id="{8CCD0FF0-4DF7-478C-BC78-91C7B71D7068}"/>
+              </a:ext>
+            </a:extLst>
+          </p:cNvPr>
+          <p:cNvCxnSpPr>
+            <a:cxnSpLocks/>
+          </p:cNvCxnSpPr>
+          <p:nvPr/>
+        </p:nvCxnSpPr>
+        <p:spPr>
+          <a:xfrm rot="5400000">
+            <a:off x="4441970" y="2810912"/>
+            <a:ext cx="1115736" cy="1107347"/>
+          </a:xfrm>
+          <a:prstGeom prst="bentConnector3">
+            <a:avLst/>
+          </a:prstGeom>
+          <a:ln>
+            <a:tailEnd type="triangle"/>
+          </a:ln>
+        </p:spPr>
+        <p:style>
+          <a:lnRef idx="1">
+            <a:schemeClr val="dk1"/>
+          </a:lnRef>
+          <a:fillRef idx="0">
+            <a:schemeClr val="dk1"/>
+          </a:fillRef>
+          <a:effectRef idx="0">
+            <a:schemeClr val="dk1"/>
+          </a:effectRef>
+          <a:fontRef idx="minor">
+            <a:schemeClr val="tx1"/>
+          </a:fontRef>
+        </p:style>
+      </p:cxnSp>
+      <p:sp>
+        <p:nvSpPr>
+          <p:cNvPr id="7" name="Retângulo 6">
+            <a:extLst>
+              <a:ext uri="{FF2B5EF4-FFF2-40B4-BE49-F238E27FC236}">
+                <a16:creationId xmlns:a16="http://schemas.microsoft.com/office/drawing/2014/main" id="{77DDDAF1-9863-45D7-B60D-60B068FE2C23}"/>
+              </a:ext>
+            </a:extLst>
+          </p:cNvPr>
+          <p:cNvSpPr/>
+          <p:nvPr/>
+        </p:nvSpPr>
+        <p:spPr>
+          <a:xfrm>
+            <a:off x="3584014" y="3922454"/>
+            <a:ext cx="4509448" cy="707886"/>
+          </a:xfrm>
+          <a:prstGeom prst="rect">
+            <a:avLst/>
+          </a:prstGeom>
+        </p:spPr>
+        <p:txBody>
+          <a:bodyPr wrap="square">
+            <a:spAutoFit/>
+          </a:bodyPr>
+          <a:lstStyle/>
+          <a:p>
+            <a:pPr algn="ctr"/>
+            <a:r>
+              <a:rPr lang="pt-BR" sz="4000" b="1" dirty="0">
+                <a:effectLst>
+                  <a:outerShdw blurRad="38100" dist="38100" dir="2700000" algn="tl">
+                    <a:srgbClr val="000000">
+                      <a:alpha val="43137"/>
+                    </a:srgbClr>
+                  </a:outerShdw>
+                </a:effectLst>
+                <a:latin typeface="Roboto Th" pitchFamily="2" charset="0"/>
+                <a:ea typeface="Roboto Th" pitchFamily="2" charset="0"/>
+              </a:rPr>
+              <a:t>g(x) = g’(x) + g’’(x)</a:t>
+            </a:r>
+          </a:p>
+        </p:txBody>
+      </p:sp>
+      <p:cxnSp>
+        <p:nvCxnSpPr>
+          <p:cNvPr id="10" name="Conector de Seta Reta 9">
+            <a:extLst>
+              <a:ext uri="{FF2B5EF4-FFF2-40B4-BE49-F238E27FC236}">
+                <a16:creationId xmlns:a16="http://schemas.microsoft.com/office/drawing/2014/main" id="{E418F776-4A85-4C1F-8374-7A147E4A0333}"/>
+              </a:ext>
+            </a:extLst>
+          </p:cNvPr>
+          <p:cNvCxnSpPr>
+            <a:cxnSpLocks/>
+          </p:cNvCxnSpPr>
+          <p:nvPr/>
+        </p:nvCxnSpPr>
+        <p:spPr>
+          <a:xfrm flipV="1">
+            <a:off x="7474590" y="897620"/>
+            <a:ext cx="0" cy="838900"/>
+          </a:xfrm>
+          <a:prstGeom prst="straightConnector1">
+            <a:avLst/>
+          </a:prstGeom>
+          <a:ln>
+            <a:tailEnd type="triangle"/>
+          </a:ln>
+        </p:spPr>
+        <p:style>
+          <a:lnRef idx="1">
+            <a:schemeClr val="dk1"/>
+          </a:lnRef>
+          <a:fillRef idx="0">
+            <a:schemeClr val="dk1"/>
+          </a:fillRef>
+          <a:effectRef idx="0">
+            <a:schemeClr val="dk1"/>
+          </a:effectRef>
+          <a:fontRef idx="minor">
+            <a:schemeClr val="tx1"/>
+          </a:fontRef>
+        </p:style>
+      </p:cxnSp>
+      <p:cxnSp>
+        <p:nvCxnSpPr>
+          <p:cNvPr id="12" name="Conector reto 11">
+            <a:extLst>
+              <a:ext uri="{FF2B5EF4-FFF2-40B4-BE49-F238E27FC236}">
+                <a16:creationId xmlns:a16="http://schemas.microsoft.com/office/drawing/2014/main" id="{7A10C633-CF7D-4B6D-9389-DB91CABCCC5B}"/>
+              </a:ext>
+            </a:extLst>
+          </p:cNvPr>
+          <p:cNvCxnSpPr>
+            <a:cxnSpLocks/>
+          </p:cNvCxnSpPr>
+          <p:nvPr/>
+        </p:nvCxnSpPr>
+        <p:spPr>
+          <a:xfrm>
+            <a:off x="6452866" y="612394"/>
+            <a:ext cx="2060225" cy="0"/>
+          </a:xfrm>
+          <a:prstGeom prst="line">
+            <a:avLst/>
+          </a:prstGeom>
+        </p:spPr>
+        <p:style>
+          <a:lnRef idx="1">
+            <a:schemeClr val="dk1"/>
+          </a:lnRef>
+          <a:fillRef idx="0">
+            <a:schemeClr val="dk1"/>
+          </a:fillRef>
+          <a:effectRef idx="0">
+            <a:schemeClr val="dk1"/>
+          </a:effectRef>
+          <a:fontRef idx="minor">
+            <a:schemeClr val="tx1"/>
+          </a:fontRef>
+        </p:style>
+      </p:cxnSp>
+      <p:cxnSp>
+        <p:nvCxnSpPr>
+          <p:cNvPr id="19" name="Conector: Angulado 18">
+            <a:extLst>
+              <a:ext uri="{FF2B5EF4-FFF2-40B4-BE49-F238E27FC236}">
+                <a16:creationId xmlns:a16="http://schemas.microsoft.com/office/drawing/2014/main" id="{73143596-417C-4378-86B0-9E23379A8C93}"/>
+              </a:ext>
+            </a:extLst>
+          </p:cNvPr>
+          <p:cNvCxnSpPr>
+            <a:cxnSpLocks/>
+          </p:cNvCxnSpPr>
+          <p:nvPr/>
+        </p:nvCxnSpPr>
+        <p:spPr>
+          <a:xfrm rot="10800000" flipV="1">
+            <a:off x="4311941" y="5099206"/>
+            <a:ext cx="1526798" cy="739531"/>
+          </a:xfrm>
+          <a:prstGeom prst="bentConnector3">
+            <a:avLst/>
+          </a:prstGeom>
+          <a:ln>
+            <a:tailEnd type="triangle"/>
+          </a:ln>
+        </p:spPr>
+        <p:style>
+          <a:lnRef idx="1">
+            <a:schemeClr val="dk1"/>
+          </a:lnRef>
+          <a:fillRef idx="0">
+            <a:schemeClr val="dk1"/>
+          </a:fillRef>
+          <a:effectRef idx="0">
+            <a:schemeClr val="dk1"/>
+          </a:effectRef>
+          <a:fontRef idx="minor">
+            <a:schemeClr val="tx1"/>
+          </a:fontRef>
+        </p:style>
+      </p:cxnSp>
+      <p:cxnSp>
+        <p:nvCxnSpPr>
+          <p:cNvPr id="22" name="Conector de Seta Reta 21">
+            <a:extLst>
+              <a:ext uri="{FF2B5EF4-FFF2-40B4-BE49-F238E27FC236}">
+                <a16:creationId xmlns:a16="http://schemas.microsoft.com/office/drawing/2014/main" id="{444E8D4C-9931-4E1F-A6F8-E8663EF9DBAC}"/>
+              </a:ext>
+            </a:extLst>
+          </p:cNvPr>
+          <p:cNvCxnSpPr>
+            <a:cxnSpLocks/>
+          </p:cNvCxnSpPr>
+          <p:nvPr/>
+        </p:nvCxnSpPr>
+        <p:spPr>
+          <a:xfrm flipV="1">
+            <a:off x="5838738" y="4630341"/>
+            <a:ext cx="0" cy="468866"/>
+          </a:xfrm>
+          <a:prstGeom prst="straightConnector1">
+            <a:avLst/>
+          </a:prstGeom>
+          <a:ln>
+            <a:tailEnd type="triangle"/>
+          </a:ln>
+        </p:spPr>
+        <p:style>
+          <a:lnRef idx="1">
+            <a:schemeClr val="dk1"/>
+          </a:lnRef>
+          <a:fillRef idx="0">
+            <a:schemeClr val="dk1"/>
+          </a:fillRef>
+          <a:effectRef idx="0">
+            <a:schemeClr val="dk1"/>
+          </a:effectRef>
+          <a:fontRef idx="minor">
+            <a:schemeClr val="tx1"/>
+          </a:fontRef>
+        </p:style>
+      </p:cxnSp>
+      <p:pic>
+        <p:nvPicPr>
+          <p:cNvPr id="28" name="Imagem 27" descr="Uma imagem contendo coisa&#10;&#10;Descrição gerada com alta confiança">
+            <a:extLst>
+              <a:ext uri="{FF2B5EF4-FFF2-40B4-BE49-F238E27FC236}">
+                <a16:creationId xmlns:a16="http://schemas.microsoft.com/office/drawing/2014/main" id="{82CAD011-91E3-4B9F-BA20-797F6603AA43}"/>
+              </a:ext>
+            </a:extLst>
+          </p:cNvPr>
+          <p:cNvPicPr>
+            <a:picLocks noChangeAspect="1"/>
+          </p:cNvPicPr>
+          <p:nvPr/>
+        </p:nvPicPr>
+        <p:blipFill>
+          <a:blip r:embed="rId3">
+            <a:extLst>
+              <a:ext uri="{28A0092B-C50C-407E-A947-70E740481C1C}">
+                <a14:useLocalDpi xmlns:a14="http://schemas.microsoft.com/office/drawing/2010/main" val="0"/>
+              </a:ext>
+            </a:extLst>
+          </a:blip>
+          <a:stretch>
+            <a:fillRect/>
+          </a:stretch>
+        </p:blipFill>
+        <p:spPr>
+          <a:xfrm>
+            <a:off x="1585563" y="4422385"/>
+            <a:ext cx="2461168" cy="2461168"/>
+          </a:xfrm>
+          <a:prstGeom prst="rect">
+            <a:avLst/>
+          </a:prstGeom>
+        </p:spPr>
+      </p:pic>
+      <p:cxnSp>
+        <p:nvCxnSpPr>
+          <p:cNvPr id="29" name="Conector: Angulado 28">
+            <a:extLst>
+              <a:ext uri="{FF2B5EF4-FFF2-40B4-BE49-F238E27FC236}">
+                <a16:creationId xmlns:a16="http://schemas.microsoft.com/office/drawing/2014/main" id="{5FC22150-92C1-4FCE-B90E-CA5AD0788AD6}"/>
+              </a:ext>
+            </a:extLst>
+          </p:cNvPr>
+          <p:cNvCxnSpPr>
+            <a:cxnSpLocks/>
+          </p:cNvCxnSpPr>
+          <p:nvPr/>
+        </p:nvCxnSpPr>
+        <p:spPr>
+          <a:xfrm>
+            <a:off x="6837026" y="5095829"/>
+            <a:ext cx="1317073" cy="742909"/>
+          </a:xfrm>
+          <a:prstGeom prst="bentConnector3">
+            <a:avLst/>
+          </a:prstGeom>
+          <a:ln>
+            <a:tailEnd type="triangle"/>
+          </a:ln>
+        </p:spPr>
+        <p:style>
+          <a:lnRef idx="1">
+            <a:schemeClr val="dk1"/>
+          </a:lnRef>
+          <a:fillRef idx="0">
+            <a:schemeClr val="dk1"/>
+          </a:fillRef>
+          <a:effectRef idx="0">
+            <a:schemeClr val="dk1"/>
+          </a:effectRef>
+          <a:fontRef idx="minor">
+            <a:schemeClr val="tx1"/>
+          </a:fontRef>
+        </p:style>
+      </p:cxnSp>
+      <p:cxnSp>
+        <p:nvCxnSpPr>
+          <p:cNvPr id="31" name="Conector de Seta Reta 30">
+            <a:extLst>
+              <a:ext uri="{FF2B5EF4-FFF2-40B4-BE49-F238E27FC236}">
+                <a16:creationId xmlns:a16="http://schemas.microsoft.com/office/drawing/2014/main" id="{39B59CB2-1981-457E-82B8-BC42563FEB29}"/>
+              </a:ext>
+            </a:extLst>
+          </p:cNvPr>
+          <p:cNvCxnSpPr>
+            <a:cxnSpLocks/>
+          </p:cNvCxnSpPr>
+          <p:nvPr/>
+        </p:nvCxnSpPr>
+        <p:spPr>
+          <a:xfrm flipV="1">
+            <a:off x="6837026" y="4630341"/>
+            <a:ext cx="0" cy="468866"/>
+          </a:xfrm>
+          <a:prstGeom prst="straightConnector1">
+            <a:avLst/>
+          </a:prstGeom>
+          <a:ln>
+            <a:tailEnd type="triangle"/>
+          </a:ln>
+        </p:spPr>
+        <p:style>
+          <a:lnRef idx="1">
+            <a:schemeClr val="dk1"/>
+          </a:lnRef>
+          <a:fillRef idx="0">
+            <a:schemeClr val="dk1"/>
+          </a:fillRef>
+          <a:effectRef idx="0">
+            <a:schemeClr val="dk1"/>
+          </a:effectRef>
+          <a:fontRef idx="minor">
+            <a:schemeClr val="tx1"/>
+          </a:fontRef>
+        </p:style>
+      </p:cxnSp>
+      <p:sp>
+        <p:nvSpPr>
+          <p:cNvPr id="33" name="CaixaDeTexto 32">
+            <a:extLst>
+              <a:ext uri="{FF2B5EF4-FFF2-40B4-BE49-F238E27FC236}">
+                <a16:creationId xmlns:a16="http://schemas.microsoft.com/office/drawing/2014/main" id="{9A660A6A-03AF-4FB7-BCA0-48DF36D52FC4}"/>
+              </a:ext>
+            </a:extLst>
+          </p:cNvPr>
+          <p:cNvSpPr txBox="1"/>
+          <p:nvPr/>
+        </p:nvSpPr>
+        <p:spPr>
+          <a:xfrm>
+            <a:off x="8254767" y="5467283"/>
+            <a:ext cx="1124125" cy="584775"/>
+          </a:xfrm>
+          <a:prstGeom prst="rect">
+            <a:avLst/>
+          </a:prstGeom>
+          <a:noFill/>
+        </p:spPr>
+        <p:txBody>
+          <a:bodyPr wrap="square" rtlCol="0">
+            <a:spAutoFit/>
+          </a:bodyPr>
+          <a:lstStyle/>
+          <a:p>
+            <a:pPr algn="ctr"/>
+            <a:r>
+              <a:rPr lang="pt-BR" sz="3200" b="1" dirty="0">
+                <a:latin typeface="Roboto Th" pitchFamily="2" charset="0"/>
+                <a:ea typeface="Roboto Th" pitchFamily="2" charset="0"/>
+              </a:rPr>
+              <a:t>KM</a:t>
+            </a:r>
+            <a:endParaRPr lang="pt-BR" sz="800" b="1" dirty="0">
+              <a:latin typeface="Roboto Th" pitchFamily="2" charset="0"/>
+              <a:ea typeface="Roboto Th" pitchFamily="2" charset="0"/>
+            </a:endParaRPr>
+          </a:p>
+        </p:txBody>
+      </p:sp>
+    </p:spTree>
+    <p:extLst>
+      <p:ext uri="{BB962C8B-B14F-4D97-AF65-F5344CB8AC3E}">
+        <p14:creationId xmlns:p14="http://schemas.microsoft.com/office/powerpoint/2010/main" val="1764162693"/>
+      </p:ext>
+    </p:extLst>
+  </p:cSld>
+  <p:clrMapOvr>
+    <a:masterClrMapping/>
+  </p:clrMapOvr>
+  <mc:AlternateContent xmlns:mc="http://schemas.openxmlformats.org/markup-compatibility/2006" xmlns:p159="http://schemas.microsoft.com/office/powerpoint/2015/09/main">
+    <mc:Choice Requires="p159">
+      <p:transition xmlns:p14="http://schemas.microsoft.com/office/powerpoint/2010/main" spd="slow" p14:dur="2000">
+        <p159:morph option="byObject"/>
+      </p:transition>
+    </mc:Choice>
+    <mc:Fallback xmlns="">
+      <p:transition spd="slow">
+        <p:fade/>
+      </p:transition>
+    </mc:Fallback>
+  </mc:AlternateContent>
+  <p:timing>
+    <p:tnLst>
+      <p:par>
+        <p:cTn id="1" dur="indefinite" restart="never" nodeType="tmRoot">
+          <p:childTnLst>
+            <p:seq concurrent="1" nextAc="seek">
+              <p:cTn id="2" dur="indefinite" nodeType="mainSeq">
+                <p:childTnLst>
+                  <p:par>
+                    <p:cTn id="3" fill="hold">
+                      <p:stCondLst>
+                        <p:cond delay="indefinite"/>
+                      </p:stCondLst>
+                      <p:childTnLst>
+                        <p:par>
+                          <p:cTn id="4" fill="hold">
+                            <p:stCondLst>
+                              <p:cond delay="0"/>
+                            </p:stCondLst>
+                            <p:childTnLst>
+                              <p:par>
+                                <p:cTn id="5" presetID="10" presetClass="entr" presetSubtype="0" fill="hold" grpId="0" nodeType="clickEffect">
+                                  <p:stCondLst>
+                                    <p:cond delay="0"/>
+                                  </p:stCondLst>
+                                  <p:childTnLst>
+                                    <p:set>
+                                      <p:cBhvr>
+                                        <p:cTn id="6" dur="1" fill="hold">
+                                          <p:stCondLst>
+                                            <p:cond delay="0"/>
+                                          </p:stCondLst>
+                                        </p:cTn>
+                                        <p:tgtEl>
+                                          <p:spTgt spid="5"/>
+                                        </p:tgtEl>
+                                        <p:attrNameLst>
+                                          <p:attrName>style.visibility</p:attrName>
+                                        </p:attrNameLst>
+                                      </p:cBhvr>
+                                      <p:to>
+                                        <p:strVal val="visible"/>
+                                      </p:to>
+                                    </p:set>
+                                    <p:animEffect transition="in" filter="fade">
+                                      <p:cBhvr>
+                                        <p:cTn id="7" dur="500"/>
+                                        <p:tgtEl>
+                                          <p:spTgt spid="5"/>
+                                        </p:tgtEl>
+                                      </p:cBhvr>
+                                    </p:animEffect>
+                                  </p:childTnLst>
+                                </p:cTn>
+                              </p:par>
+                            </p:childTnLst>
+                          </p:cTn>
+                        </p:par>
+                      </p:childTnLst>
+                    </p:cTn>
+                  </p:par>
+                  <p:par>
+                    <p:cTn id="8" fill="hold">
+                      <p:stCondLst>
+                        <p:cond delay="indefinite"/>
+                      </p:stCondLst>
+                      <p:childTnLst>
+                        <p:par>
+                          <p:cTn id="9" fill="hold">
+                            <p:stCondLst>
+                              <p:cond delay="0"/>
+                            </p:stCondLst>
+                            <p:childTnLst>
+                              <p:par>
+                                <p:cTn id="10" presetID="10" presetClass="entr" presetSubtype="0" fill="hold" nodeType="clickEffect">
+                                  <p:stCondLst>
+                                    <p:cond delay="0"/>
+                                  </p:stCondLst>
+                                  <p:childTnLst>
+                                    <p:set>
+                                      <p:cBhvr>
+                                        <p:cTn id="11" dur="1" fill="hold">
+                                          <p:stCondLst>
+                                            <p:cond delay="0"/>
+                                          </p:stCondLst>
+                                        </p:cTn>
+                                        <p:tgtEl>
+                                          <p:spTgt spid="6"/>
+                                        </p:tgtEl>
+                                        <p:attrNameLst>
+                                          <p:attrName>style.visibility</p:attrName>
+                                        </p:attrNameLst>
+                                      </p:cBhvr>
+                                      <p:to>
+                                        <p:strVal val="visible"/>
+                                      </p:to>
+                                    </p:set>
+                                    <p:animEffect transition="in" filter="fade">
+                                      <p:cBhvr>
+                                        <p:cTn id="12" dur="500"/>
+                                        <p:tgtEl>
+                                          <p:spTgt spid="6"/>
+                                        </p:tgtEl>
+                                      </p:cBhvr>
+                                    </p:animEffect>
+                                  </p:childTnLst>
+                                </p:cTn>
+                              </p:par>
+                            </p:childTnLst>
+                          </p:cTn>
+                        </p:par>
+                      </p:childTnLst>
+                    </p:cTn>
+                  </p:par>
+                  <p:par>
+                    <p:cTn id="13" fill="hold">
+                      <p:stCondLst>
+                        <p:cond delay="indefinite"/>
+                      </p:stCondLst>
+                      <p:childTnLst>
+                        <p:par>
+                          <p:cTn id="14" fill="hold">
+                            <p:stCondLst>
+                              <p:cond delay="0"/>
+                            </p:stCondLst>
+                            <p:childTnLst>
+                              <p:par>
+                                <p:cTn id="15" presetID="10" presetClass="entr" presetSubtype="0" fill="hold" grpId="0" nodeType="clickEffect">
+                                  <p:stCondLst>
+                                    <p:cond delay="0"/>
+                                  </p:stCondLst>
+                                  <p:childTnLst>
+                                    <p:set>
+                                      <p:cBhvr>
+                                        <p:cTn id="16" dur="1" fill="hold">
+                                          <p:stCondLst>
+                                            <p:cond delay="0"/>
+                                          </p:stCondLst>
+                                        </p:cTn>
+                                        <p:tgtEl>
+                                          <p:spTgt spid="7"/>
+                                        </p:tgtEl>
+                                        <p:attrNameLst>
+                                          <p:attrName>style.visibility</p:attrName>
+                                        </p:attrNameLst>
+                                      </p:cBhvr>
+                                      <p:to>
+                                        <p:strVal val="visible"/>
+                                      </p:to>
+                                    </p:set>
+                                    <p:animEffect transition="in" filter="fade">
+                                      <p:cBhvr>
+                                        <p:cTn id="17" dur="500"/>
+                                        <p:tgtEl>
+                                          <p:spTgt spid="7"/>
+                                        </p:tgtEl>
+                                      </p:cBhvr>
+                                    </p:animEffect>
+                                  </p:childTnLst>
+                                </p:cTn>
+                              </p:par>
+                            </p:childTnLst>
+                          </p:cTn>
+                        </p:par>
+                      </p:childTnLst>
+                    </p:cTn>
+                  </p:par>
+                  <p:par>
+                    <p:cTn id="18" fill="hold">
+                      <p:stCondLst>
+                        <p:cond delay="indefinite"/>
+                      </p:stCondLst>
+                      <p:childTnLst>
+                        <p:par>
+                          <p:cTn id="19" fill="hold">
+                            <p:stCondLst>
+                              <p:cond delay="0"/>
+                            </p:stCondLst>
+                            <p:childTnLst>
+                              <p:par>
+                                <p:cTn id="20" presetID="10" presetClass="entr" presetSubtype="0" fill="hold" nodeType="clickEffect">
+                                  <p:stCondLst>
+                                    <p:cond delay="0"/>
+                                  </p:stCondLst>
+                                  <p:childTnLst>
+                                    <p:set>
+                                      <p:cBhvr>
+                                        <p:cTn id="21" dur="1" fill="hold">
+                                          <p:stCondLst>
+                                            <p:cond delay="0"/>
+                                          </p:stCondLst>
+                                        </p:cTn>
+                                        <p:tgtEl>
+                                          <p:spTgt spid="19"/>
+                                        </p:tgtEl>
+                                        <p:attrNameLst>
+                                          <p:attrName>style.visibility</p:attrName>
+                                        </p:attrNameLst>
+                                      </p:cBhvr>
+                                      <p:to>
+                                        <p:strVal val="visible"/>
+                                      </p:to>
+                                    </p:set>
+                                    <p:animEffect transition="in" filter="fade">
+                                      <p:cBhvr>
+                                        <p:cTn id="22" dur="500"/>
+                                        <p:tgtEl>
+                                          <p:spTgt spid="19"/>
+                                        </p:tgtEl>
+                                      </p:cBhvr>
+                                    </p:animEffect>
+                                  </p:childTnLst>
+                                </p:cTn>
+                              </p:par>
+                              <p:par>
+                                <p:cTn id="23" presetID="10" presetClass="entr" presetSubtype="0" fill="hold" nodeType="withEffect">
+                                  <p:stCondLst>
+                                    <p:cond delay="0"/>
+                                  </p:stCondLst>
+                                  <p:childTnLst>
+                                    <p:set>
+                                      <p:cBhvr>
+                                        <p:cTn id="24" dur="1" fill="hold">
+                                          <p:stCondLst>
+                                            <p:cond delay="0"/>
+                                          </p:stCondLst>
+                                        </p:cTn>
+                                        <p:tgtEl>
+                                          <p:spTgt spid="22"/>
+                                        </p:tgtEl>
+                                        <p:attrNameLst>
+                                          <p:attrName>style.visibility</p:attrName>
+                                        </p:attrNameLst>
+                                      </p:cBhvr>
+                                      <p:to>
+                                        <p:strVal val="visible"/>
+                                      </p:to>
+                                    </p:set>
+                                    <p:animEffect transition="in" filter="fade">
+                                      <p:cBhvr>
+                                        <p:cTn id="25" dur="500"/>
+                                        <p:tgtEl>
+                                          <p:spTgt spid="22"/>
+                                        </p:tgtEl>
+                                      </p:cBhvr>
+                                    </p:animEffect>
+                                  </p:childTnLst>
+                                </p:cTn>
+                              </p:par>
+                              <p:par>
+                                <p:cTn id="26" presetID="10" presetClass="entr" presetSubtype="0" fill="hold" nodeType="withEffect">
+                                  <p:stCondLst>
+                                    <p:cond delay="0"/>
+                                  </p:stCondLst>
+                                  <p:childTnLst>
+                                    <p:set>
+                                      <p:cBhvr>
+                                        <p:cTn id="27" dur="1" fill="hold">
+                                          <p:stCondLst>
+                                            <p:cond delay="0"/>
+                                          </p:stCondLst>
+                                        </p:cTn>
+                                        <p:tgtEl>
+                                          <p:spTgt spid="28"/>
+                                        </p:tgtEl>
+                                        <p:attrNameLst>
+                                          <p:attrName>style.visibility</p:attrName>
+                                        </p:attrNameLst>
+                                      </p:cBhvr>
+                                      <p:to>
+                                        <p:strVal val="visible"/>
+                                      </p:to>
+                                    </p:set>
+                                    <p:animEffect transition="in" filter="fade">
+                                      <p:cBhvr>
+                                        <p:cTn id="28" dur="500"/>
+                                        <p:tgtEl>
+                                          <p:spTgt spid="28"/>
+                                        </p:tgtEl>
+                                      </p:cBhvr>
+                                    </p:animEffect>
+                                  </p:childTnLst>
+                                </p:cTn>
+                              </p:par>
+                            </p:childTnLst>
+                          </p:cTn>
+                        </p:par>
+                      </p:childTnLst>
+                    </p:cTn>
+                  </p:par>
+                  <p:par>
+                    <p:cTn id="29" fill="hold">
+                      <p:stCondLst>
+                        <p:cond delay="indefinite"/>
+                      </p:stCondLst>
+                      <p:childTnLst>
+                        <p:par>
+                          <p:cTn id="30" fill="hold">
+                            <p:stCondLst>
+                              <p:cond delay="0"/>
+                            </p:stCondLst>
+                            <p:childTnLst>
+                              <p:par>
+                                <p:cTn id="31" presetID="10" presetClass="entr" presetSubtype="0" fill="hold" nodeType="clickEffect">
+                                  <p:stCondLst>
+                                    <p:cond delay="0"/>
+                                  </p:stCondLst>
+                                  <p:childTnLst>
+                                    <p:set>
+                                      <p:cBhvr>
+                                        <p:cTn id="32" dur="1" fill="hold">
+                                          <p:stCondLst>
+                                            <p:cond delay="0"/>
+                                          </p:stCondLst>
+                                        </p:cTn>
+                                        <p:tgtEl>
+                                          <p:spTgt spid="29"/>
+                                        </p:tgtEl>
+                                        <p:attrNameLst>
+                                          <p:attrName>style.visibility</p:attrName>
+                                        </p:attrNameLst>
+                                      </p:cBhvr>
+                                      <p:to>
+                                        <p:strVal val="visible"/>
+                                      </p:to>
+                                    </p:set>
+                                    <p:animEffect transition="in" filter="fade">
+                                      <p:cBhvr>
+                                        <p:cTn id="33" dur="500"/>
+                                        <p:tgtEl>
+                                          <p:spTgt spid="29"/>
+                                        </p:tgtEl>
+                                      </p:cBhvr>
+                                    </p:animEffect>
+                                  </p:childTnLst>
+                                </p:cTn>
+                              </p:par>
+                              <p:par>
+                                <p:cTn id="34" presetID="10" presetClass="entr" presetSubtype="0" fill="hold" nodeType="withEffect">
+                                  <p:stCondLst>
+                                    <p:cond delay="0"/>
+                                  </p:stCondLst>
+                                  <p:childTnLst>
+                                    <p:set>
+                                      <p:cBhvr>
+                                        <p:cTn id="35" dur="1" fill="hold">
+                                          <p:stCondLst>
+                                            <p:cond delay="0"/>
+                                          </p:stCondLst>
+                                        </p:cTn>
+                                        <p:tgtEl>
+                                          <p:spTgt spid="31"/>
+                                        </p:tgtEl>
+                                        <p:attrNameLst>
+                                          <p:attrName>style.visibility</p:attrName>
+                                        </p:attrNameLst>
+                                      </p:cBhvr>
+                                      <p:to>
+                                        <p:strVal val="visible"/>
+                                      </p:to>
+                                    </p:set>
+                                    <p:animEffect transition="in" filter="fade">
+                                      <p:cBhvr>
+                                        <p:cTn id="36" dur="500"/>
+                                        <p:tgtEl>
+                                          <p:spTgt spid="31"/>
+                                        </p:tgtEl>
+                                      </p:cBhvr>
+                                    </p:animEffect>
+                                  </p:childTnLst>
+                                </p:cTn>
+                              </p:par>
+                            </p:childTnLst>
+                          </p:cTn>
+                        </p:par>
+                      </p:childTnLst>
+                    </p:cTn>
+                  </p:par>
+                  <p:par>
+                    <p:cTn id="37" fill="hold">
+                      <p:stCondLst>
+                        <p:cond delay="indefinite"/>
+                      </p:stCondLst>
+                      <p:childTnLst>
+                        <p:par>
+                          <p:cTn id="38" fill="hold">
+                            <p:stCondLst>
+                              <p:cond delay="0"/>
+                            </p:stCondLst>
+                            <p:childTnLst>
+                              <p:par>
+                                <p:cTn id="39" presetID="10" presetClass="entr" presetSubtype="0" fill="hold" grpId="0" nodeType="clickEffect">
+                                  <p:stCondLst>
+                                    <p:cond delay="0"/>
+                                  </p:stCondLst>
+                                  <p:childTnLst>
+                                    <p:set>
+                                      <p:cBhvr>
+                                        <p:cTn id="40" dur="1" fill="hold">
+                                          <p:stCondLst>
+                                            <p:cond delay="0"/>
+                                          </p:stCondLst>
+                                        </p:cTn>
+                                        <p:tgtEl>
+                                          <p:spTgt spid="33"/>
+                                        </p:tgtEl>
+                                        <p:attrNameLst>
+                                          <p:attrName>style.visibility</p:attrName>
+                                        </p:attrNameLst>
+                                      </p:cBhvr>
+                                      <p:to>
+                                        <p:strVal val="visible"/>
+                                      </p:to>
+                                    </p:set>
+                                    <p:animEffect transition="in" filter="fade">
+                                      <p:cBhvr>
+                                        <p:cTn id="41" dur="500"/>
+                                        <p:tgtEl>
+                                          <p:spTgt spid="33"/>
+                                        </p:tgtEl>
+                                      </p:cBhvr>
+                                    </p:animEffect>
+                                  </p:childTnLst>
+                                </p:cTn>
+                              </p:par>
+                            </p:childTnLst>
+                          </p:cTn>
+                        </p:par>
+                      </p:childTnLst>
+                    </p:cTn>
+                  </p:par>
+                  <p:par>
+                    <p:cTn id="42" fill="hold">
+                      <p:stCondLst>
+                        <p:cond delay="indefinite"/>
+                      </p:stCondLst>
+                      <p:childTnLst>
+                        <p:par>
+                          <p:cTn id="43" fill="hold">
+                            <p:stCondLst>
+                              <p:cond delay="0"/>
+                            </p:stCondLst>
+                            <p:childTnLst>
+                              <p:par>
+                                <p:cTn id="44" presetID="10" presetClass="entr" presetSubtype="0" fill="hold" nodeType="clickEffect">
+                                  <p:stCondLst>
+                                    <p:cond delay="0"/>
+                                  </p:stCondLst>
+                                  <p:childTnLst>
+                                    <p:set>
+                                      <p:cBhvr>
+                                        <p:cTn id="45" dur="1" fill="hold">
+                                          <p:stCondLst>
+                                            <p:cond delay="0"/>
+                                          </p:stCondLst>
+                                        </p:cTn>
+                                        <p:tgtEl>
+                                          <p:spTgt spid="10"/>
+                                        </p:tgtEl>
+                                        <p:attrNameLst>
+                                          <p:attrName>style.visibility</p:attrName>
+                                        </p:attrNameLst>
+                                      </p:cBhvr>
+                                      <p:to>
+                                        <p:strVal val="visible"/>
+                                      </p:to>
+                                    </p:set>
+                                    <p:animEffect transition="in" filter="fade">
+                                      <p:cBhvr>
+                                        <p:cTn id="46" dur="500"/>
+                                        <p:tgtEl>
+                                          <p:spTgt spid="10"/>
+                                        </p:tgtEl>
+                                      </p:cBhvr>
+                                    </p:animEffect>
+                                  </p:childTnLst>
+                                </p:cTn>
+                              </p:par>
+                            </p:childTnLst>
+                          </p:cTn>
+                        </p:par>
+                      </p:childTnLst>
+                    </p:cTn>
+                  </p:par>
+                  <p:par>
+                    <p:cTn id="47" fill="hold">
+                      <p:stCondLst>
+                        <p:cond delay="indefinite"/>
+                      </p:stCondLst>
+                      <p:childTnLst>
+                        <p:par>
+                          <p:cTn id="48" fill="hold">
+                            <p:stCondLst>
+                              <p:cond delay="0"/>
+                            </p:stCondLst>
+                            <p:childTnLst>
+                              <p:par>
+                                <p:cTn id="49" presetID="1" presetClass="entr" presetSubtype="0" fill="hold" nodeType="clickEffect">
+                                  <p:stCondLst>
+                                    <p:cond delay="0"/>
+                                  </p:stCondLst>
+                                  <p:childTnLst>
+                                    <p:set>
+                                      <p:cBhvr>
+                                        <p:cTn id="50" dur="1" fill="hold">
+                                          <p:stCondLst>
+                                            <p:cond delay="0"/>
+                                          </p:stCondLst>
+                                        </p:cTn>
+                                        <p:tgtEl>
+                                          <p:spTgt spid="12"/>
+                                        </p:tgtEl>
+                                        <p:attrNameLst>
+                                          <p:attrName>style.visibility</p:attrName>
+                                        </p:attrNameLst>
+                                      </p:cBhvr>
+                                      <p:to>
+                                        <p:strVal val="visible"/>
+                                      </p:to>
+                                    </p:set>
+                                  </p:childTnLst>
+                                </p:cTn>
+                              </p:par>
+                            </p:childTnLst>
+                          </p:cTn>
+                        </p:par>
+                      </p:childTnLst>
+                    </p:cTn>
+                  </p:par>
+                </p:childTnLst>
+              </p:cTn>
+              <p:prevCondLst>
+                <p:cond evt="onPrev" delay="0">
+                  <p:tgtEl>
+                    <p:sldTgt/>
+                  </p:tgtEl>
+                </p:cond>
+              </p:prevCondLst>
+              <p:nextCondLst>
+                <p:cond evt="onNext" delay="0">
+                  <p:tgtEl>
+                    <p:sldTgt/>
+                  </p:tgtEl>
+                </p:cond>
+              </p:nextCondLst>
+            </p:seq>
+          </p:childTnLst>
+        </p:cTn>
+      </p:par>
+    </p:tnLst>
+    <p:bldLst>
+      <p:bldP spid="5" grpId="0"/>
+      <p:bldP spid="7" grpId="0"/>
+      <p:bldP spid="33" grpId="0"/>
+    </p:bldLst>
+  </p:timing>
+</p:sld>
+</file>
+
+<file path=ppt/slides/slide11.xml><?xml version="1.0" encoding="utf-8"?>
+<p:sld xmlns:a="http://schemas.openxmlformats.org/drawingml/2006/main" xmlns:r="http://schemas.openxmlformats.org/officeDocument/2006/relationships" xmlns:p="http://schemas.openxmlformats.org/presentationml/2006/main">
+  <p:cSld>
+    <p:spTree>
+      <p:nvGrpSpPr>
+        <p:cNvPr id="1" name=""/>
+        <p:cNvGrpSpPr/>
+        <p:nvPr/>
+      </p:nvGrpSpPr>
+      <p:grpSpPr>
+        <a:xfrm>
+          <a:off x="0" y="0"/>
+          <a:ext cx="0" cy="0"/>
+          <a:chOff x="0" y="0"/>
+          <a:chExt cx="0" cy="0"/>
+        </a:xfrm>
+      </p:grpSpPr>
+      <p:pic>
+        <p:nvPicPr>
+          <p:cNvPr id="11" name="Imagem 10">
+            <a:extLst>
+              <a:ext uri="{FF2B5EF4-FFF2-40B4-BE49-F238E27FC236}">
+                <a16:creationId xmlns:a16="http://schemas.microsoft.com/office/drawing/2014/main" id="{1BA5CE3A-4649-484C-A539-F7FBE27E7525}"/>
+              </a:ext>
+            </a:extLst>
+          </p:cNvPr>
+          <p:cNvPicPr>
+            <a:picLocks noChangeAspect="1"/>
+          </p:cNvPicPr>
+          <p:nvPr/>
+        </p:nvPicPr>
+        <p:blipFill>
+          <a:blip r:embed="rId2">
+            <a:extLst>
+              <a:ext uri="{28A0092B-C50C-407E-A947-70E740481C1C}">
+                <a14:useLocalDpi xmlns:a14="http://schemas.microsoft.com/office/drawing/2010/main" val="0"/>
+              </a:ext>
+            </a:extLst>
+          </a:blip>
+          <a:stretch>
+            <a:fillRect/>
+          </a:stretch>
+        </p:blipFill>
+        <p:spPr>
+          <a:xfrm>
+            <a:off x="0" y="0"/>
+            <a:ext cx="12192000" cy="6856286"/>
+          </a:xfrm>
+          <a:prstGeom prst="rect">
+            <a:avLst/>
+          </a:prstGeom>
+        </p:spPr>
+      </p:pic>
+      <p:pic>
+        <p:nvPicPr>
+          <p:cNvPr id="3" name="Imagem 2" descr="Uma imagem contendo texto, mapa&#10;&#10;Descrição gerada com muito alta confiança">
+            <a:extLst>
+              <a:ext uri="{FF2B5EF4-FFF2-40B4-BE49-F238E27FC236}">
+                <a16:creationId xmlns:a16="http://schemas.microsoft.com/office/drawing/2014/main" id="{2661C664-2AF1-44FE-8E99-F46451549460}"/>
+              </a:ext>
+            </a:extLst>
+          </p:cNvPr>
+          <p:cNvPicPr>
+            <a:picLocks noChangeAspect="1"/>
+          </p:cNvPicPr>
+          <p:nvPr/>
+        </p:nvPicPr>
+        <p:blipFill>
+          <a:blip r:embed="rId3">
+            <a:extLst>
+              <a:ext uri="{28A0092B-C50C-407E-A947-70E740481C1C}">
+                <a14:useLocalDpi xmlns:a14="http://schemas.microsoft.com/office/drawing/2010/main" val="0"/>
+              </a:ext>
+            </a:extLst>
+          </a:blip>
+          <a:stretch>
+            <a:fillRect/>
+          </a:stretch>
+        </p:blipFill>
+        <p:spPr>
+          <a:xfrm>
+            <a:off x="3935933" y="204416"/>
+            <a:ext cx="8084045" cy="6447453"/>
+          </a:xfrm>
+          <a:prstGeom prst="rect">
+            <a:avLst/>
+          </a:prstGeom>
+          <a:ln>
+            <a:noFill/>
+          </a:ln>
+          <a:effectLst>
+            <a:outerShdw blurRad="292100" dist="139700" dir="2700000" algn="tl" rotWithShape="0">
+              <a:srgbClr val="333333">
+                <a:alpha val="65000"/>
+              </a:srgbClr>
+            </a:outerShdw>
+          </a:effectLst>
+        </p:spPr>
+      </p:pic>
+      <p:sp>
+        <p:nvSpPr>
+          <p:cNvPr id="6" name="CaixaDeTexto 5">
+            <a:extLst>
+              <a:ext uri="{FF2B5EF4-FFF2-40B4-BE49-F238E27FC236}">
+                <a16:creationId xmlns:a16="http://schemas.microsoft.com/office/drawing/2014/main" id="{0CDDDA0A-7545-41CF-99D3-777DFDFEB6CB}"/>
+              </a:ext>
+            </a:extLst>
+          </p:cNvPr>
+          <p:cNvSpPr txBox="1"/>
+          <p:nvPr/>
+        </p:nvSpPr>
+        <p:spPr>
+          <a:xfrm>
+            <a:off x="-1203721" y="2518150"/>
+            <a:ext cx="6189551" cy="1200329"/>
+          </a:xfrm>
+          <a:prstGeom prst="rect">
+            <a:avLst/>
+          </a:prstGeom>
+          <a:noFill/>
+        </p:spPr>
+        <p:txBody>
+          <a:bodyPr wrap="square" rtlCol="0">
+            <a:spAutoFit/>
+          </a:bodyPr>
+          <a:lstStyle/>
+          <a:p>
+            <a:pPr algn="ctr"/>
+            <a:r>
+              <a:rPr lang="pt-BR" sz="7200" b="1" dirty="0">
+                <a:latin typeface="Roboto Th" pitchFamily="2" charset="0"/>
+                <a:ea typeface="Roboto Th" pitchFamily="2" charset="0"/>
+              </a:rPr>
+              <a:t>Interface</a:t>
+            </a:r>
+            <a:endParaRPr lang="pt-BR" b="1" dirty="0">
+              <a:latin typeface="Roboto Th" pitchFamily="2" charset="0"/>
+              <a:ea typeface="Roboto Th" pitchFamily="2" charset="0"/>
+            </a:endParaRPr>
+          </a:p>
+        </p:txBody>
+      </p:sp>
+    </p:spTree>
+    <p:extLst>
+      <p:ext uri="{BB962C8B-B14F-4D97-AF65-F5344CB8AC3E}">
+        <p14:creationId xmlns:p14="http://schemas.microsoft.com/office/powerpoint/2010/main" val="2451225944"/>
+      </p:ext>
+    </p:extLst>
+  </p:cSld>
+  <p:clrMapOvr>
+    <a:masterClrMapping/>
+  </p:clrMapOvr>
+  <mc:AlternateContent xmlns:mc="http://schemas.openxmlformats.org/markup-compatibility/2006">
+    <mc:Choice xmlns:p159="http://schemas.microsoft.com/office/powerpoint/2015/09/main" Requires="p159">
+      <p:transition xmlns:p14="http://schemas.microsoft.com/office/powerpoint/2010/main" spd="slow" p14:dur="2000">
+        <p159:morph option="byObject"/>
+      </p:transition>
+    </mc:Choice>
+    <mc:Fallback>
+      <p:transition spd="slow">
+        <p:fade/>
+      </p:transition>
+    </mc:Fallback>
+  </mc:AlternateContent>
+  <p:timing>
+    <p:tnLst>
+      <p:par>
+        <p:cTn id="1" dur="indefinite" restart="never" nodeType="tmRoot">
+          <p:childTnLst>
+            <p:seq concurrent="1" nextAc="seek">
+              <p:cTn id="2" dur="indefinite" nodeType="mainSeq">
+                <p:childTnLst>
+                  <p:par>
+                    <p:cTn id="3" fill="hold">
+                      <p:stCondLst>
+                        <p:cond delay="indefinite"/>
+                      </p:stCondLst>
+                      <p:childTnLst>
+                        <p:par>
+                          <p:cTn id="4" fill="hold">
+                            <p:stCondLst>
+                              <p:cond delay="0"/>
+                            </p:stCondLst>
+                            <p:childTnLst>
+                              <p:par>
+                                <p:cTn id="5" presetID="42" presetClass="entr" presetSubtype="0" fill="hold" nodeType="clickEffect">
+                                  <p:stCondLst>
+                                    <p:cond delay="0"/>
+                                  </p:stCondLst>
+                                  <p:childTnLst>
+                                    <p:set>
+                                      <p:cBhvr>
+                                        <p:cTn id="6" dur="1" fill="hold">
+                                          <p:stCondLst>
+                                            <p:cond delay="0"/>
+                                          </p:stCondLst>
+                                        </p:cTn>
+                                        <p:tgtEl>
+                                          <p:spTgt spid="3"/>
+                                        </p:tgtEl>
+                                        <p:attrNameLst>
+                                          <p:attrName>style.visibility</p:attrName>
+                                        </p:attrNameLst>
+                                      </p:cBhvr>
+                                      <p:to>
+                                        <p:strVal val="visible"/>
+                                      </p:to>
+                                    </p:set>
+                                    <p:animEffect transition="in" filter="fade">
+                                      <p:cBhvr>
+                                        <p:cTn id="7" dur="1000"/>
+                                        <p:tgtEl>
+                                          <p:spTgt spid="3"/>
+                                        </p:tgtEl>
+                                      </p:cBhvr>
+                                    </p:animEffect>
+                                    <p:anim calcmode="lin" valueType="num">
+                                      <p:cBhvr>
+                                        <p:cTn id="8" dur="1000" fill="hold"/>
+                                        <p:tgtEl>
+                                          <p:spTgt spid="3"/>
+                                        </p:tgtEl>
+                                        <p:attrNameLst>
+                                          <p:attrName>ppt_x</p:attrName>
+                                        </p:attrNameLst>
+                                      </p:cBhvr>
+                                      <p:tavLst>
+                                        <p:tav tm="0">
+                                          <p:val>
+                                            <p:strVal val="#ppt_x"/>
+                                          </p:val>
+                                        </p:tav>
+                                        <p:tav tm="100000">
+                                          <p:val>
+                                            <p:strVal val="#ppt_x"/>
+                                          </p:val>
+                                        </p:tav>
+                                      </p:tavLst>
+                                    </p:anim>
+                                    <p:anim calcmode="lin" valueType="num">
+                                      <p:cBhvr>
+                                        <p:cTn id="9" dur="1000" fill="hold"/>
+                                        <p:tgtEl>
+                                          <p:spTgt spid="3"/>
+                                        </p:tgtEl>
+                                        <p:attrNameLst>
+                                          <p:attrName>ppt_y</p:attrName>
+                                        </p:attrNameLst>
+                                      </p:cBhvr>
+                                      <p:tavLst>
+                                        <p:tav tm="0">
+                                          <p:val>
+                                            <p:strVal val="#ppt_y+.1"/>
+                                          </p:val>
+                                        </p:tav>
+                                        <p:tav tm="100000">
+                                          <p:val>
+                                            <p:strVal val="#ppt_y"/>
+                                          </p:val>
+                                        </p:tav>
+                                      </p:tavLst>
+                                    </p:anim>
+                                  </p:childTnLst>
+                                </p:cTn>
+                              </p:par>
+                            </p:childTnLst>
+                          </p:cTn>
+                        </p:par>
+                      </p:childTnLst>
+                    </p:cTn>
+                  </p:par>
+                </p:childTnLst>
+              </p:cTn>
+              <p:prevCondLst>
+                <p:cond evt="onPrev" delay="0">
+                  <p:tgtEl>
+                    <p:sldTgt/>
+                  </p:tgtEl>
+                </p:cond>
+              </p:prevCondLst>
+              <p:nextCondLst>
+                <p:cond evt="onNext" delay="0">
+                  <p:tgtEl>
+                    <p:sldTgt/>
+                  </p:tgtEl>
+                </p:cond>
+              </p:nextCondLst>
+            </p:seq>
+          </p:childTnLst>
+        </p:cTn>
+      </p:par>
+    </p:tnLst>
+  </p:timing>
+</p:sld>
+</file>
+
+<file path=ppt/slides/slide12.xml><?xml version="1.0" encoding="utf-8"?>
+<p:sld xmlns:a="http://schemas.openxmlformats.org/drawingml/2006/main" xmlns:r="http://schemas.openxmlformats.org/officeDocument/2006/relationships" xmlns:p="http://schemas.openxmlformats.org/presentationml/2006/main">
+  <p:cSld>
+    <p:spTree>
+      <p:nvGrpSpPr>
+        <p:cNvPr id="1" name=""/>
+        <p:cNvGrpSpPr/>
+        <p:nvPr/>
+      </p:nvGrpSpPr>
+      <p:grpSpPr>
+        <a:xfrm>
+          <a:off x="0" y="0"/>
+          <a:ext cx="0" cy="0"/>
+          <a:chOff x="0" y="0"/>
+          <a:chExt cx="0" cy="0"/>
+        </a:xfrm>
+      </p:grpSpPr>
+      <p:pic>
+        <p:nvPicPr>
+          <p:cNvPr id="11" name="Imagem 10">
+            <a:extLst>
+              <a:ext uri="{FF2B5EF4-FFF2-40B4-BE49-F238E27FC236}">
+                <a16:creationId xmlns:a16="http://schemas.microsoft.com/office/drawing/2014/main" id="{1BA5CE3A-4649-484C-A539-F7FBE27E7525}"/>
+              </a:ext>
+            </a:extLst>
+          </p:cNvPr>
+          <p:cNvPicPr>
+            <a:picLocks noChangeAspect="1"/>
+          </p:cNvPicPr>
+          <p:nvPr/>
+        </p:nvPicPr>
+        <p:blipFill>
+          <a:blip r:embed="rId2">
+            <a:extLst>
+              <a:ext uri="{28A0092B-C50C-407E-A947-70E740481C1C}">
+                <a14:useLocalDpi xmlns:a14="http://schemas.microsoft.com/office/drawing/2010/main" val="0"/>
+              </a:ext>
+            </a:extLst>
+          </a:blip>
+          <a:stretch>
+            <a:fillRect/>
+          </a:stretch>
+        </p:blipFill>
+        <p:spPr>
+          <a:xfrm>
+            <a:off x="0" y="0"/>
+            <a:ext cx="12192000" cy="6856286"/>
+          </a:xfrm>
+          <a:prstGeom prst="rect">
+            <a:avLst/>
+          </a:prstGeom>
+        </p:spPr>
+      </p:pic>
       <p:pic>
         <p:nvPicPr>
           <p:cNvPr id="3" name="Imagem 2">
@@ -3679,248 +5111,6 @@
 </p:sld>
 </file>
 
-<file path=ppt/slides/slide11.xml><?xml version="1.0" encoding="utf-8"?>
-<p:sld xmlns:a="http://schemas.openxmlformats.org/drawingml/2006/main" xmlns:r="http://schemas.openxmlformats.org/officeDocument/2006/relationships" xmlns:p="http://schemas.openxmlformats.org/presentationml/2006/main">
-  <p:cSld>
-    <p:spTree>
-      <p:nvGrpSpPr>
-        <p:cNvPr id="1" name=""/>
-        <p:cNvGrpSpPr/>
-        <p:nvPr/>
-      </p:nvGrpSpPr>
-      <p:grpSpPr>
-        <a:xfrm>
-          <a:off x="0" y="0"/>
-          <a:ext cx="0" cy="0"/>
-          <a:chOff x="0" y="0"/>
-          <a:chExt cx="0" cy="0"/>
-        </a:xfrm>
-      </p:grpSpPr>
-      <p:pic>
-        <p:nvPicPr>
-          <p:cNvPr id="11" name="Imagem 10">
-            <a:extLst>
-              <a:ext uri="{FF2B5EF4-FFF2-40B4-BE49-F238E27FC236}">
-                <a16:creationId xmlns:a16="http://schemas.microsoft.com/office/drawing/2014/main" id="{1BA5CE3A-4649-484C-A539-F7FBE27E7525}"/>
-              </a:ext>
-            </a:extLst>
-          </p:cNvPr>
-          <p:cNvPicPr>
-            <a:picLocks noChangeAspect="1"/>
-          </p:cNvPicPr>
-          <p:nvPr/>
-        </p:nvPicPr>
-        <p:blipFill>
-          <a:blip r:embed="rId2">
-            <a:extLst>
-              <a:ext uri="{28A0092B-C50C-407E-A947-70E740481C1C}">
-                <a14:useLocalDpi xmlns:a14="http://schemas.microsoft.com/office/drawing/2010/main" val="0"/>
-              </a:ext>
-            </a:extLst>
-          </a:blip>
-          <a:stretch>
-            <a:fillRect/>
-          </a:stretch>
-        </p:blipFill>
-        <p:spPr>
-          <a:xfrm>
-            <a:off x="0" y="0"/>
-            <a:ext cx="12192000" cy="6856286"/>
-          </a:xfrm>
-          <a:prstGeom prst="rect">
-            <a:avLst/>
-          </a:prstGeom>
-        </p:spPr>
-      </p:pic>
-      <p:sp>
-        <p:nvSpPr>
-          <p:cNvPr id="13" name="CaixaDeTexto 12">
-            <a:extLst>
-              <a:ext uri="{FF2B5EF4-FFF2-40B4-BE49-F238E27FC236}">
-                <a16:creationId xmlns:a16="http://schemas.microsoft.com/office/drawing/2014/main" id="{AAC7F2BF-F00D-48ED-ABE1-5A414EE16F94}"/>
-              </a:ext>
-            </a:extLst>
-          </p:cNvPr>
-          <p:cNvSpPr txBox="1"/>
-          <p:nvPr/>
-        </p:nvSpPr>
-        <p:spPr>
-          <a:xfrm>
-            <a:off x="2491528" y="2263346"/>
-            <a:ext cx="7208939" cy="1446550"/>
-          </a:xfrm>
-          <a:prstGeom prst="rect">
-            <a:avLst/>
-          </a:prstGeom>
-          <a:noFill/>
-        </p:spPr>
-        <p:txBody>
-          <a:bodyPr wrap="square" rtlCol="0">
-            <a:spAutoFit/>
-          </a:bodyPr>
-          <a:lstStyle/>
-          <a:p>
-            <a:pPr algn="ctr"/>
-            <a:r>
-              <a:rPr lang="pt-BR" sz="8800" b="1" dirty="0">
-                <a:latin typeface="Roboto Th" pitchFamily="2" charset="0"/>
-                <a:ea typeface="Roboto Th" pitchFamily="2" charset="0"/>
-              </a:rPr>
-              <a:t>Execução</a:t>
-            </a:r>
-            <a:endParaRPr lang="pt-BR" sz="2400" b="1" dirty="0">
-              <a:latin typeface="Roboto Th" pitchFamily="2" charset="0"/>
-              <a:ea typeface="Roboto Th" pitchFamily="2" charset="0"/>
-            </a:endParaRPr>
-          </a:p>
-        </p:txBody>
-      </p:sp>
-    </p:spTree>
-    <p:extLst>
-      <p:ext uri="{BB962C8B-B14F-4D97-AF65-F5344CB8AC3E}">
-        <p14:creationId xmlns:p14="http://schemas.microsoft.com/office/powerpoint/2010/main" val="2160493347"/>
-      </p:ext>
-    </p:extLst>
-  </p:cSld>
-  <p:clrMapOvr>
-    <a:masterClrMapping/>
-  </p:clrMapOvr>
-  <mc:AlternateContent xmlns:mc="http://schemas.openxmlformats.org/markup-compatibility/2006" xmlns:p159="http://schemas.microsoft.com/office/powerpoint/2015/09/main">
-    <mc:Choice Requires="p159">
-      <p:transition xmlns:p14="http://schemas.microsoft.com/office/powerpoint/2010/main" spd="slow" p14:dur="2000">
-        <p159:morph option="byObject"/>
-      </p:transition>
-    </mc:Choice>
-    <mc:Fallback xmlns="">
-      <p:transition spd="slow">
-        <p:fade/>
-      </p:transition>
-    </mc:Fallback>
-  </mc:AlternateContent>
-</p:sld>
-</file>
-
-<file path=ppt/slides/slide12.xml><?xml version="1.0" encoding="utf-8"?>
-<p:sld xmlns:a="http://schemas.openxmlformats.org/drawingml/2006/main" xmlns:r="http://schemas.openxmlformats.org/officeDocument/2006/relationships" xmlns:p="http://schemas.openxmlformats.org/presentationml/2006/main">
-  <p:cSld>
-    <p:spTree>
-      <p:nvGrpSpPr>
-        <p:cNvPr id="1" name=""/>
-        <p:cNvGrpSpPr/>
-        <p:nvPr/>
-      </p:nvGrpSpPr>
-      <p:grpSpPr>
-        <a:xfrm>
-          <a:off x="0" y="0"/>
-          <a:ext cx="0" cy="0"/>
-          <a:chOff x="0" y="0"/>
-          <a:chExt cx="0" cy="0"/>
-        </a:xfrm>
-      </p:grpSpPr>
-      <p:pic>
-        <p:nvPicPr>
-          <p:cNvPr id="11" name="Imagem 10">
-            <a:extLst>
-              <a:ext uri="{FF2B5EF4-FFF2-40B4-BE49-F238E27FC236}">
-                <a16:creationId xmlns:a16="http://schemas.microsoft.com/office/drawing/2014/main" id="{1BA5CE3A-4649-484C-A539-F7FBE27E7525}"/>
-              </a:ext>
-            </a:extLst>
-          </p:cNvPr>
-          <p:cNvPicPr>
-            <a:picLocks noChangeAspect="1"/>
-          </p:cNvPicPr>
-          <p:nvPr/>
-        </p:nvPicPr>
-        <p:blipFill>
-          <a:blip r:embed="rId2">
-            <a:extLst>
-              <a:ext uri="{28A0092B-C50C-407E-A947-70E740481C1C}">
-                <a14:useLocalDpi xmlns:a14="http://schemas.microsoft.com/office/drawing/2010/main" val="0"/>
-              </a:ext>
-            </a:extLst>
-          </a:blip>
-          <a:stretch>
-            <a:fillRect/>
-          </a:stretch>
-        </p:blipFill>
-        <p:spPr>
-          <a:xfrm>
-            <a:off x="0" y="0"/>
-            <a:ext cx="12192000" cy="6856286"/>
-          </a:xfrm>
-          <a:prstGeom prst="rect">
-            <a:avLst/>
-          </a:prstGeom>
-        </p:spPr>
-      </p:pic>
-      <p:sp>
-        <p:nvSpPr>
-          <p:cNvPr id="13" name="CaixaDeTexto 12">
-            <a:extLst>
-              <a:ext uri="{FF2B5EF4-FFF2-40B4-BE49-F238E27FC236}">
-                <a16:creationId xmlns:a16="http://schemas.microsoft.com/office/drawing/2014/main" id="{AAC7F2BF-F00D-48ED-ABE1-5A414EE16F94}"/>
-              </a:ext>
-            </a:extLst>
-          </p:cNvPr>
-          <p:cNvSpPr txBox="1"/>
-          <p:nvPr/>
-        </p:nvSpPr>
-        <p:spPr>
-          <a:xfrm>
-            <a:off x="2491528" y="2263346"/>
-            <a:ext cx="7208939" cy="1446550"/>
-          </a:xfrm>
-          <a:prstGeom prst="rect">
-            <a:avLst/>
-          </a:prstGeom>
-          <a:noFill/>
-        </p:spPr>
-        <p:txBody>
-          <a:bodyPr wrap="square" rtlCol="0">
-            <a:spAutoFit/>
-          </a:bodyPr>
-          <a:lstStyle/>
-          <a:p>
-            <a:pPr algn="ctr"/>
-            <a:r>
-              <a:rPr lang="pt-BR" sz="8800" b="1" dirty="0">
-                <a:latin typeface="Roboto Th" pitchFamily="2" charset="0"/>
-                <a:ea typeface="Roboto Th" pitchFamily="2" charset="0"/>
-              </a:rPr>
-              <a:t>Algoritmo</a:t>
-            </a:r>
-            <a:endParaRPr lang="pt-BR" sz="2400" b="1" dirty="0">
-              <a:latin typeface="Roboto Th" pitchFamily="2" charset="0"/>
-              <a:ea typeface="Roboto Th" pitchFamily="2" charset="0"/>
-            </a:endParaRPr>
-          </a:p>
-        </p:txBody>
-      </p:sp>
-    </p:spTree>
-    <p:extLst>
-      <p:ext uri="{BB962C8B-B14F-4D97-AF65-F5344CB8AC3E}">
-        <p14:creationId xmlns:p14="http://schemas.microsoft.com/office/powerpoint/2010/main" val="2151190342"/>
-      </p:ext>
-    </p:extLst>
-  </p:cSld>
-  <p:clrMapOvr>
-    <a:masterClrMapping/>
-  </p:clrMapOvr>
-  <mc:AlternateContent xmlns:mc="http://schemas.openxmlformats.org/markup-compatibility/2006" xmlns:p159="http://schemas.microsoft.com/office/powerpoint/2015/09/main">
-    <mc:Choice Requires="p159">
-      <p:transition xmlns:p14="http://schemas.microsoft.com/office/powerpoint/2010/main" spd="slow" p14:dur="2000">
-        <p159:morph option="byObject"/>
-      </p:transition>
-    </mc:Choice>
-    <mc:Fallback xmlns="">
-      <p:transition spd="slow">
-        <p:fade/>
-      </p:transition>
-    </mc:Fallback>
-  </mc:AlternateContent>
-</p:sld>
-</file>
-
 <file path=ppt/slides/slide13.xml><?xml version="1.0" encoding="utf-8"?>
 <p:sld xmlns:a="http://schemas.openxmlformats.org/drawingml/2006/main" xmlns:r="http://schemas.openxmlformats.org/officeDocument/2006/relationships" xmlns:p="http://schemas.openxmlformats.org/presentationml/2006/main">
   <p:cSld>
@@ -3974,46 +5164,53 @@
           </a:prstGeom>
         </p:spPr>
       </p:pic>
-      <p:pic>
-        <p:nvPicPr>
-          <p:cNvPr id="4" name="Imagem 3" descr="Uma imagem contendo captura de tela&#10;&#10;Descrição gerada com muito alta confiança">
-            <a:extLst>
-              <a:ext uri="{FF2B5EF4-FFF2-40B4-BE49-F238E27FC236}">
-                <a16:creationId xmlns:a16="http://schemas.microsoft.com/office/drawing/2014/main" id="{F07258D9-29F2-4688-B536-B2B73E8802FB}"/>
-              </a:ext>
-            </a:extLst>
-          </p:cNvPr>
-          <p:cNvPicPr>
-            <a:picLocks noChangeAspect="1"/>
-          </p:cNvPicPr>
+      <p:sp>
+        <p:nvSpPr>
+          <p:cNvPr id="13" name="CaixaDeTexto 12">
+            <a:extLst>
+              <a:ext uri="{FF2B5EF4-FFF2-40B4-BE49-F238E27FC236}">
+                <a16:creationId xmlns:a16="http://schemas.microsoft.com/office/drawing/2014/main" id="{AAC7F2BF-F00D-48ED-ABE1-5A414EE16F94}"/>
+              </a:ext>
+            </a:extLst>
+          </p:cNvPr>
+          <p:cNvSpPr txBox="1"/>
           <p:nvPr/>
-        </p:nvPicPr>
-        <p:blipFill>
-          <a:blip r:embed="rId3">
-            <a:extLst>
-              <a:ext uri="{28A0092B-C50C-407E-A947-70E740481C1C}">
-                <a14:useLocalDpi xmlns:a14="http://schemas.microsoft.com/office/drawing/2010/main" val="0"/>
-              </a:ext>
-            </a:extLst>
-          </a:blip>
-          <a:stretch>
-            <a:fillRect/>
-          </a:stretch>
-        </p:blipFill>
+        </p:nvSpPr>
         <p:spPr>
           <a:xfrm>
-            <a:off x="366946" y="614771"/>
-            <a:ext cx="11458108" cy="5786028"/>
+            <a:off x="2491528" y="2263346"/>
+            <a:ext cx="7208939" cy="1446550"/>
           </a:xfrm>
           <a:prstGeom prst="rect">
             <a:avLst/>
           </a:prstGeom>
+          <a:noFill/>
         </p:spPr>
-      </p:pic>
+        <p:txBody>
+          <a:bodyPr wrap="square" rtlCol="0">
+            <a:spAutoFit/>
+          </a:bodyPr>
+          <a:lstStyle/>
+          <a:p>
+            <a:pPr algn="ctr"/>
+            <a:r>
+              <a:rPr lang="pt-BR" sz="8800" b="1" dirty="0">
+                <a:latin typeface="Roboto Th" pitchFamily="2" charset="0"/>
+                <a:ea typeface="Roboto Th" pitchFamily="2" charset="0"/>
+              </a:rPr>
+              <a:t>Execução</a:t>
+            </a:r>
+            <a:endParaRPr lang="pt-BR" sz="2400" b="1" dirty="0">
+              <a:latin typeface="Roboto Th" pitchFamily="2" charset="0"/>
+              <a:ea typeface="Roboto Th" pitchFamily="2" charset="0"/>
+            </a:endParaRPr>
+          </a:p>
+        </p:txBody>
+      </p:sp>
     </p:spTree>
     <p:extLst>
       <p:ext uri="{BB962C8B-B14F-4D97-AF65-F5344CB8AC3E}">
-        <p14:creationId xmlns:p14="http://schemas.microsoft.com/office/powerpoint/2010/main" val="1629912234"/>
+        <p14:creationId xmlns:p14="http://schemas.microsoft.com/office/powerpoint/2010/main" val="2160493347"/>
       </p:ext>
     </p:extLst>
   </p:cSld>
@@ -4088,46 +5285,53 @@
           </a:prstGeom>
         </p:spPr>
       </p:pic>
-      <p:pic>
-        <p:nvPicPr>
-          <p:cNvPr id="3" name="Imagem 2" descr="Uma imagem contendo captura de tela&#10;&#10;Descrição gerada com muito alta confiança">
-            <a:extLst>
-              <a:ext uri="{FF2B5EF4-FFF2-40B4-BE49-F238E27FC236}">
-                <a16:creationId xmlns:a16="http://schemas.microsoft.com/office/drawing/2014/main" id="{59FEC887-579D-4F98-B1AE-76D3B3AA56BD}"/>
-              </a:ext>
-            </a:extLst>
-          </p:cNvPr>
-          <p:cNvPicPr>
-            <a:picLocks noChangeAspect="1"/>
-          </p:cNvPicPr>
+      <p:sp>
+        <p:nvSpPr>
+          <p:cNvPr id="13" name="CaixaDeTexto 12">
+            <a:extLst>
+              <a:ext uri="{FF2B5EF4-FFF2-40B4-BE49-F238E27FC236}">
+                <a16:creationId xmlns:a16="http://schemas.microsoft.com/office/drawing/2014/main" id="{AAC7F2BF-F00D-48ED-ABE1-5A414EE16F94}"/>
+              </a:ext>
+            </a:extLst>
+          </p:cNvPr>
+          <p:cNvSpPr txBox="1"/>
           <p:nvPr/>
-        </p:nvPicPr>
-        <p:blipFill>
-          <a:blip r:embed="rId3">
-            <a:extLst>
-              <a:ext uri="{28A0092B-C50C-407E-A947-70E740481C1C}">
-                <a14:useLocalDpi xmlns:a14="http://schemas.microsoft.com/office/drawing/2010/main" val="0"/>
-              </a:ext>
-            </a:extLst>
-          </a:blip>
-          <a:stretch>
-            <a:fillRect/>
-          </a:stretch>
-        </p:blipFill>
+        </p:nvSpPr>
         <p:spPr>
           <a:xfrm>
-            <a:off x="1121618" y="212445"/>
-            <a:ext cx="9948764" cy="6431395"/>
+            <a:off x="2491528" y="2263346"/>
+            <a:ext cx="7208939" cy="1446550"/>
           </a:xfrm>
           <a:prstGeom prst="rect">
             <a:avLst/>
           </a:prstGeom>
+          <a:noFill/>
         </p:spPr>
-      </p:pic>
+        <p:txBody>
+          <a:bodyPr wrap="square" rtlCol="0">
+            <a:spAutoFit/>
+          </a:bodyPr>
+          <a:lstStyle/>
+          <a:p>
+            <a:pPr algn="ctr"/>
+            <a:r>
+              <a:rPr lang="pt-BR" sz="8800" b="1" dirty="0">
+                <a:latin typeface="Roboto Th" pitchFamily="2" charset="0"/>
+                <a:ea typeface="Roboto Th" pitchFamily="2" charset="0"/>
+              </a:rPr>
+              <a:t>Algoritmo</a:t>
+            </a:r>
+            <a:endParaRPr lang="pt-BR" sz="2400" b="1" dirty="0">
+              <a:latin typeface="Roboto Th" pitchFamily="2" charset="0"/>
+              <a:ea typeface="Roboto Th" pitchFamily="2" charset="0"/>
+            </a:endParaRPr>
+          </a:p>
+        </p:txBody>
+      </p:sp>
     </p:spTree>
     <p:extLst>
       <p:ext uri="{BB962C8B-B14F-4D97-AF65-F5344CB8AC3E}">
-        <p14:creationId xmlns:p14="http://schemas.microsoft.com/office/powerpoint/2010/main" val="1407738279"/>
+        <p14:creationId xmlns:p14="http://schemas.microsoft.com/office/powerpoint/2010/main" val="2151190342"/>
       </p:ext>
     </p:extLst>
   </p:cSld>
@@ -4204,10 +5408,10 @@
       </p:pic>
       <p:pic>
         <p:nvPicPr>
-          <p:cNvPr id="5" name="Imagem 4" descr="Uma imagem contendo captura de tela&#10;&#10;Descrição gerada com muito alta confiança">
-            <a:extLst>
-              <a:ext uri="{FF2B5EF4-FFF2-40B4-BE49-F238E27FC236}">
-                <a16:creationId xmlns:a16="http://schemas.microsoft.com/office/drawing/2014/main" id="{CC899E5F-992B-40B4-8FB6-7B6D68ADAF8F}"/>
+          <p:cNvPr id="4" name="Imagem 3" descr="Uma imagem contendo captura de tela&#10;&#10;Descrição gerada com muito alta confiança">
+            <a:extLst>
+              <a:ext uri="{FF2B5EF4-FFF2-40B4-BE49-F238E27FC236}">
+                <a16:creationId xmlns:a16="http://schemas.microsoft.com/office/drawing/2014/main" id="{F07258D9-29F2-4688-B536-B2B73E8802FB}"/>
               </a:ext>
             </a:extLst>
           </p:cNvPr>
@@ -4230,8 +5434,8 @@
         </p:blipFill>
         <p:spPr>
           <a:xfrm>
-            <a:off x="171130" y="2333718"/>
-            <a:ext cx="11849740" cy="2338950"/>
+            <a:off x="366946" y="614771"/>
+            <a:ext cx="11458108" cy="5786028"/>
           </a:xfrm>
           <a:prstGeom prst="rect">
             <a:avLst/>
@@ -4241,7 +5445,7 @@
     </p:spTree>
     <p:extLst>
       <p:ext uri="{BB962C8B-B14F-4D97-AF65-F5344CB8AC3E}">
-        <p14:creationId xmlns:p14="http://schemas.microsoft.com/office/powerpoint/2010/main" val="1210111248"/>
+        <p14:creationId xmlns:p14="http://schemas.microsoft.com/office/powerpoint/2010/main" val="1629912234"/>
       </p:ext>
     </p:extLst>
   </p:cSld>
@@ -4316,53 +5520,46 @@
           </a:prstGeom>
         </p:spPr>
       </p:pic>
-      <p:sp>
-        <p:nvSpPr>
-          <p:cNvPr id="5" name="CaixaDeTexto 4">
-            <a:extLst>
-              <a:ext uri="{FF2B5EF4-FFF2-40B4-BE49-F238E27FC236}">
-                <a16:creationId xmlns:a16="http://schemas.microsoft.com/office/drawing/2014/main" id="{631F001F-A09F-46EC-B9EC-9DAA79ED2815}"/>
-              </a:ext>
-            </a:extLst>
-          </p:cNvPr>
-          <p:cNvSpPr txBox="1"/>
+      <p:pic>
+        <p:nvPicPr>
+          <p:cNvPr id="3" name="Imagem 2" descr="Uma imagem contendo captura de tela&#10;&#10;Descrição gerada com muito alta confiança">
+            <a:extLst>
+              <a:ext uri="{FF2B5EF4-FFF2-40B4-BE49-F238E27FC236}">
+                <a16:creationId xmlns:a16="http://schemas.microsoft.com/office/drawing/2014/main" id="{59FEC887-579D-4F98-B1AE-76D3B3AA56BD}"/>
+              </a:ext>
+            </a:extLst>
+          </p:cNvPr>
+          <p:cNvPicPr>
+            <a:picLocks noChangeAspect="1"/>
+          </p:cNvPicPr>
           <p:nvPr/>
-        </p:nvSpPr>
+        </p:nvPicPr>
+        <p:blipFill>
+          <a:blip r:embed="rId3">
+            <a:extLst>
+              <a:ext uri="{28A0092B-C50C-407E-A947-70E740481C1C}">
+                <a14:useLocalDpi xmlns:a14="http://schemas.microsoft.com/office/drawing/2010/main" val="0"/>
+              </a:ext>
+            </a:extLst>
+          </a:blip>
+          <a:stretch>
+            <a:fillRect/>
+          </a:stretch>
+        </p:blipFill>
         <p:spPr>
           <a:xfrm>
-            <a:off x="2491528" y="2263346"/>
-            <a:ext cx="7208939" cy="1446550"/>
+            <a:off x="1121618" y="212445"/>
+            <a:ext cx="9948764" cy="6431395"/>
           </a:xfrm>
           <a:prstGeom prst="rect">
             <a:avLst/>
           </a:prstGeom>
-          <a:noFill/>
         </p:spPr>
-        <p:txBody>
-          <a:bodyPr wrap="square" rtlCol="0">
-            <a:spAutoFit/>
-          </a:bodyPr>
-          <a:lstStyle/>
-          <a:p>
-            <a:pPr algn="ctr"/>
-            <a:r>
-              <a:rPr lang="pt-BR" sz="8800" b="1" dirty="0">
-                <a:latin typeface="Roboto Th" pitchFamily="2" charset="0"/>
-                <a:ea typeface="Roboto Th" pitchFamily="2" charset="0"/>
-              </a:rPr>
-              <a:t>Conclusão</a:t>
-            </a:r>
-            <a:endParaRPr lang="pt-BR" sz="2400" b="1" dirty="0">
-              <a:latin typeface="Roboto Th" pitchFamily="2" charset="0"/>
-              <a:ea typeface="Roboto Th" pitchFamily="2" charset="0"/>
-            </a:endParaRPr>
-          </a:p>
-        </p:txBody>
-      </p:sp>
+      </p:pic>
     </p:spTree>
     <p:extLst>
       <p:ext uri="{BB962C8B-B14F-4D97-AF65-F5344CB8AC3E}">
-        <p14:creationId xmlns:p14="http://schemas.microsoft.com/office/powerpoint/2010/main" val="3717836651"/>
+        <p14:creationId xmlns:p14="http://schemas.microsoft.com/office/powerpoint/2010/main" val="1407738279"/>
       </p:ext>
     </p:extLst>
   </p:cSld>
@@ -4437,53 +5634,46 @@
           </a:prstGeom>
         </p:spPr>
       </p:pic>
-      <p:sp>
-        <p:nvSpPr>
-          <p:cNvPr id="5" name="CaixaDeTexto 4">
-            <a:extLst>
-              <a:ext uri="{FF2B5EF4-FFF2-40B4-BE49-F238E27FC236}">
-                <a16:creationId xmlns:a16="http://schemas.microsoft.com/office/drawing/2014/main" id="{631F001F-A09F-46EC-B9EC-9DAA79ED2815}"/>
-              </a:ext>
-            </a:extLst>
-          </p:cNvPr>
-          <p:cNvSpPr txBox="1"/>
+      <p:pic>
+        <p:nvPicPr>
+          <p:cNvPr id="5" name="Imagem 4" descr="Uma imagem contendo captura de tela&#10;&#10;Descrição gerada com muito alta confiança">
+            <a:extLst>
+              <a:ext uri="{FF2B5EF4-FFF2-40B4-BE49-F238E27FC236}">
+                <a16:creationId xmlns:a16="http://schemas.microsoft.com/office/drawing/2014/main" id="{CC899E5F-992B-40B4-8FB6-7B6D68ADAF8F}"/>
+              </a:ext>
+            </a:extLst>
+          </p:cNvPr>
+          <p:cNvPicPr>
+            <a:picLocks noChangeAspect="1"/>
+          </p:cNvPicPr>
           <p:nvPr/>
-        </p:nvSpPr>
+        </p:nvPicPr>
+        <p:blipFill>
+          <a:blip r:embed="rId3">
+            <a:extLst>
+              <a:ext uri="{28A0092B-C50C-407E-A947-70E740481C1C}">
+                <a14:useLocalDpi xmlns:a14="http://schemas.microsoft.com/office/drawing/2010/main" val="0"/>
+              </a:ext>
+            </a:extLst>
+          </a:blip>
+          <a:stretch>
+            <a:fillRect/>
+          </a:stretch>
+        </p:blipFill>
         <p:spPr>
           <a:xfrm>
-            <a:off x="2491528" y="2263346"/>
-            <a:ext cx="7208939" cy="1446550"/>
+            <a:off x="171130" y="2333718"/>
+            <a:ext cx="11849740" cy="2338950"/>
           </a:xfrm>
           <a:prstGeom prst="rect">
             <a:avLst/>
           </a:prstGeom>
-          <a:noFill/>
         </p:spPr>
-        <p:txBody>
-          <a:bodyPr wrap="square" rtlCol="0">
-            <a:spAutoFit/>
-          </a:bodyPr>
-          <a:lstStyle/>
-          <a:p>
-            <a:pPr algn="ctr"/>
-            <a:r>
-              <a:rPr lang="pt-BR" sz="8800" b="1" dirty="0">
-                <a:latin typeface="Roboto Th" pitchFamily="2" charset="0"/>
-                <a:ea typeface="Roboto Th" pitchFamily="2" charset="0"/>
-              </a:rPr>
-              <a:t>Dúvidas?</a:t>
-            </a:r>
-            <a:endParaRPr lang="pt-BR" sz="2400" b="1" dirty="0">
-              <a:latin typeface="Roboto Th" pitchFamily="2" charset="0"/>
-              <a:ea typeface="Roboto Th" pitchFamily="2" charset="0"/>
-            </a:endParaRPr>
-          </a:p>
-        </p:txBody>
-      </p:sp>
+      </p:pic>
     </p:spTree>
     <p:extLst>
       <p:ext uri="{BB962C8B-B14F-4D97-AF65-F5344CB8AC3E}">
-        <p14:creationId xmlns:p14="http://schemas.microsoft.com/office/powerpoint/2010/main" val="3443918097"/>
+        <p14:creationId xmlns:p14="http://schemas.microsoft.com/office/powerpoint/2010/main" val="1210111248"/>
       </p:ext>
     </p:extLst>
   </p:cSld>
@@ -4572,8 +5762,8 @@
         </p:nvSpPr>
         <p:spPr>
           <a:xfrm>
-            <a:off x="1981199" y="2271736"/>
-            <a:ext cx="8229602" cy="1446550"/>
+            <a:off x="2491528" y="2263346"/>
+            <a:ext cx="7208939" cy="1446550"/>
           </a:xfrm>
           <a:prstGeom prst="rect">
             <a:avLst/>
@@ -4592,7 +5782,7 @@
                 <a:latin typeface="Roboto Th" pitchFamily="2" charset="0"/>
                 <a:ea typeface="Roboto Th" pitchFamily="2" charset="0"/>
               </a:rPr>
-              <a:t>Agradecimentos</a:t>
+              <a:t>Conclusão</a:t>
             </a:r>
             <a:endParaRPr lang="pt-BR" sz="2400" b="1" dirty="0">
               <a:latin typeface="Roboto Th" pitchFamily="2" charset="0"/>
@@ -4601,53 +5791,10 @@
           </a:p>
         </p:txBody>
       </p:sp>
-      <p:sp>
-        <p:nvSpPr>
-          <p:cNvPr id="4" name="CaixaDeTexto 3">
-            <a:extLst>
-              <a:ext uri="{FF2B5EF4-FFF2-40B4-BE49-F238E27FC236}">
-                <a16:creationId xmlns:a16="http://schemas.microsoft.com/office/drawing/2014/main" id="{E8B511B2-4E3A-4D33-BA45-9560808A8D57}"/>
-              </a:ext>
-            </a:extLst>
-          </p:cNvPr>
-          <p:cNvSpPr txBox="1"/>
-          <p:nvPr/>
-        </p:nvSpPr>
-        <p:spPr>
-          <a:xfrm>
-            <a:off x="1981199" y="3623762"/>
-            <a:ext cx="8229602" cy="954107"/>
-          </a:xfrm>
-          <a:prstGeom prst="rect">
-            <a:avLst/>
-          </a:prstGeom>
-          <a:noFill/>
-        </p:spPr>
-        <p:txBody>
-          <a:bodyPr wrap="square" rtlCol="0">
-            <a:spAutoFit/>
-          </a:bodyPr>
-          <a:lstStyle/>
-          <a:p>
-            <a:pPr algn="ctr"/>
-            <a:r>
-              <a:rPr lang="pt-BR" sz="2800" b="1" dirty="0">
-                <a:latin typeface="Roboto Th" pitchFamily="2" charset="0"/>
-                <a:ea typeface="Roboto Th" pitchFamily="2" charset="0"/>
-              </a:rPr>
-              <a:t>Disponível em: https://github.com/Marcosnto/Projeto_IA---A-</a:t>
-            </a:r>
-            <a:endParaRPr lang="pt-BR" sz="700" b="1" dirty="0">
-              <a:latin typeface="Roboto Th" pitchFamily="2" charset="0"/>
-              <a:ea typeface="Roboto Th" pitchFamily="2" charset="0"/>
-            </a:endParaRPr>
-          </a:p>
-        </p:txBody>
-      </p:sp>
     </p:spTree>
     <p:extLst>
       <p:ext uri="{BB962C8B-B14F-4D97-AF65-F5344CB8AC3E}">
-        <p14:creationId xmlns:p14="http://schemas.microsoft.com/office/powerpoint/2010/main" val="1809884459"/>
+        <p14:creationId xmlns:p14="http://schemas.microsoft.com/office/powerpoint/2010/main" val="3717836651"/>
       </p:ext>
     </p:extLst>
   </p:cSld>
@@ -4666,92 +5813,127 @@
       </p:transition>
     </mc:Fallback>
   </mc:AlternateContent>
-  <p:timing>
-    <p:tnLst>
-      <p:par>
-        <p:cTn id="1" dur="indefinite" restart="never" nodeType="tmRoot">
-          <p:childTnLst>
-            <p:seq concurrent="1" nextAc="seek">
-              <p:cTn id="2" dur="indefinite" nodeType="mainSeq">
-                <p:childTnLst>
-                  <p:par>
-                    <p:cTn id="3" fill="hold">
-                      <p:stCondLst>
-                        <p:cond delay="indefinite"/>
-                      </p:stCondLst>
-                      <p:childTnLst>
-                        <p:par>
-                          <p:cTn id="4" fill="hold">
-                            <p:stCondLst>
-                              <p:cond delay="0"/>
-                            </p:stCondLst>
-                            <p:childTnLst>
-                              <p:par>
-                                <p:cTn id="5" presetID="10" presetClass="entr" presetSubtype="0" fill="hold" grpId="0" nodeType="clickEffect">
-                                  <p:stCondLst>
-                                    <p:cond delay="0"/>
-                                  </p:stCondLst>
-                                  <p:childTnLst>
-                                    <p:set>
-                                      <p:cBhvr>
-                                        <p:cTn id="6" dur="1" fill="hold">
-                                          <p:stCondLst>
-                                            <p:cond delay="0"/>
-                                          </p:stCondLst>
-                                        </p:cTn>
-                                        <p:tgtEl>
-                                          <p:spTgt spid="4"/>
-                                        </p:tgtEl>
-                                        <p:attrNameLst>
-                                          <p:attrName>style.visibility</p:attrName>
-                                        </p:attrNameLst>
-                                      </p:cBhvr>
-                                      <p:to>
-                                        <p:strVal val="visible"/>
-                                      </p:to>
-                                    </p:set>
-                                    <p:animEffect transition="in" filter="fade">
-                                      <p:cBhvr>
-                                        <p:cTn id="7" dur="500"/>
-                                        <p:tgtEl>
-                                          <p:spTgt spid="4"/>
-                                        </p:tgtEl>
-                                      </p:cBhvr>
-                                    </p:animEffect>
-                                  </p:childTnLst>
-                                </p:cTn>
-                              </p:par>
-                            </p:childTnLst>
-                          </p:cTn>
-                        </p:par>
-                      </p:childTnLst>
-                    </p:cTn>
-                  </p:par>
-                </p:childTnLst>
-              </p:cTn>
-              <p:prevCondLst>
-                <p:cond evt="onPrev" delay="0">
-                  <p:tgtEl>
-                    <p:sldTgt/>
-                  </p:tgtEl>
-                </p:cond>
-              </p:prevCondLst>
-              <p:nextCondLst>
-                <p:cond evt="onNext" delay="0">
-                  <p:tgtEl>
-                    <p:sldTgt/>
-                  </p:tgtEl>
-                </p:cond>
-              </p:nextCondLst>
-            </p:seq>
-          </p:childTnLst>
-        </p:cTn>
-      </p:par>
-    </p:tnLst>
-    <p:bldLst>
-      <p:bldP spid="4" grpId="0"/>
-    </p:bldLst>
-  </p:timing>
+</p:sld>
+</file>
+
+<file path=ppt/slides/slide19.xml><?xml version="1.0" encoding="utf-8"?>
+<p:sld xmlns:a="http://schemas.openxmlformats.org/drawingml/2006/main" xmlns:r="http://schemas.openxmlformats.org/officeDocument/2006/relationships" xmlns:p="http://schemas.openxmlformats.org/presentationml/2006/main">
+  <p:cSld>
+    <p:spTree>
+      <p:nvGrpSpPr>
+        <p:cNvPr id="1" name=""/>
+        <p:cNvGrpSpPr/>
+        <p:nvPr/>
+      </p:nvGrpSpPr>
+      <p:grpSpPr>
+        <a:xfrm>
+          <a:off x="0" y="0"/>
+          <a:ext cx="0" cy="0"/>
+          <a:chOff x="0" y="0"/>
+          <a:chExt cx="0" cy="0"/>
+        </a:xfrm>
+      </p:grpSpPr>
+      <p:pic>
+        <p:nvPicPr>
+          <p:cNvPr id="11" name="Imagem 10">
+            <a:extLst>
+              <a:ext uri="{FF2B5EF4-FFF2-40B4-BE49-F238E27FC236}">
+                <a16:creationId xmlns:a16="http://schemas.microsoft.com/office/drawing/2014/main" id="{1BA5CE3A-4649-484C-A539-F7FBE27E7525}"/>
+              </a:ext>
+            </a:extLst>
+          </p:cNvPr>
+          <p:cNvPicPr>
+            <a:picLocks noChangeAspect="1"/>
+          </p:cNvPicPr>
+          <p:nvPr/>
+        </p:nvPicPr>
+        <p:blipFill>
+          <a:blip r:embed="rId2">
+            <a:extLst>
+              <a:ext uri="{28A0092B-C50C-407E-A947-70E740481C1C}">
+                <a14:useLocalDpi xmlns:a14="http://schemas.microsoft.com/office/drawing/2010/main" val="0"/>
+              </a:ext>
+            </a:extLst>
+          </a:blip>
+          <a:stretch>
+            <a:fillRect/>
+          </a:stretch>
+        </p:blipFill>
+        <p:spPr>
+          <a:xfrm>
+            <a:off x="0" y="0"/>
+            <a:ext cx="12192000" cy="6856286"/>
+          </a:xfrm>
+          <a:prstGeom prst="rect">
+            <a:avLst/>
+          </a:prstGeom>
+        </p:spPr>
+      </p:pic>
+      <p:sp>
+        <p:nvSpPr>
+          <p:cNvPr id="5" name="CaixaDeTexto 4">
+            <a:extLst>
+              <a:ext uri="{FF2B5EF4-FFF2-40B4-BE49-F238E27FC236}">
+                <a16:creationId xmlns:a16="http://schemas.microsoft.com/office/drawing/2014/main" id="{631F001F-A09F-46EC-B9EC-9DAA79ED2815}"/>
+              </a:ext>
+            </a:extLst>
+          </p:cNvPr>
+          <p:cNvSpPr txBox="1"/>
+          <p:nvPr/>
+        </p:nvSpPr>
+        <p:spPr>
+          <a:xfrm>
+            <a:off x="2491528" y="2263346"/>
+            <a:ext cx="7208939" cy="1446550"/>
+          </a:xfrm>
+          <a:prstGeom prst="rect">
+            <a:avLst/>
+          </a:prstGeom>
+          <a:noFill/>
+        </p:spPr>
+        <p:txBody>
+          <a:bodyPr wrap="square" rtlCol="0">
+            <a:spAutoFit/>
+          </a:bodyPr>
+          <a:lstStyle/>
+          <a:p>
+            <a:pPr algn="ctr"/>
+            <a:r>
+              <a:rPr lang="pt-BR" sz="8800" b="1" dirty="0">
+                <a:latin typeface="Roboto Th" pitchFamily="2" charset="0"/>
+                <a:ea typeface="Roboto Th" pitchFamily="2" charset="0"/>
+              </a:rPr>
+              <a:t>Dúvidas?</a:t>
+            </a:r>
+            <a:endParaRPr lang="pt-BR" sz="2400" b="1" dirty="0">
+              <a:latin typeface="Roboto Th" pitchFamily="2" charset="0"/>
+              <a:ea typeface="Roboto Th" pitchFamily="2" charset="0"/>
+            </a:endParaRPr>
+          </a:p>
+        </p:txBody>
+      </p:sp>
+    </p:spTree>
+    <p:extLst>
+      <p:ext uri="{BB962C8B-B14F-4D97-AF65-F5344CB8AC3E}">
+        <p14:creationId xmlns:p14="http://schemas.microsoft.com/office/powerpoint/2010/main" val="3443918097"/>
+      </p:ext>
+    </p:extLst>
+  </p:cSld>
+  <p:clrMapOvr>
+    <a:masterClrMapping/>
+  </p:clrMapOvr>
+  <mc:AlternateContent xmlns:mc="http://schemas.openxmlformats.org/markup-compatibility/2006" xmlns:p159="http://schemas.microsoft.com/office/powerpoint/2015/09/main">
+    <mc:Choice Requires="p159">
+      <p:transition xmlns:p14="http://schemas.microsoft.com/office/powerpoint/2010/main" spd="slow" p14:dur="2000">
+        <p159:morph option="byObject"/>
+      </p:transition>
+    </mc:Choice>
+    <mc:Fallback xmlns="">
+      <p:transition spd="slow">
+        <p:fade/>
+      </p:transition>
+    </mc:Fallback>
+  </mc:AlternateContent>
 </p:sld>
 </file>
 
@@ -5396,6 +6578,256 @@
 </p:sld>
 </file>
 
+<file path=ppt/slides/slide20.xml><?xml version="1.0" encoding="utf-8"?>
+<p:sld xmlns:a="http://schemas.openxmlformats.org/drawingml/2006/main" xmlns:r="http://schemas.openxmlformats.org/officeDocument/2006/relationships" xmlns:p="http://schemas.openxmlformats.org/presentationml/2006/main">
+  <p:cSld>
+    <p:spTree>
+      <p:nvGrpSpPr>
+        <p:cNvPr id="1" name=""/>
+        <p:cNvGrpSpPr/>
+        <p:nvPr/>
+      </p:nvGrpSpPr>
+      <p:grpSpPr>
+        <a:xfrm>
+          <a:off x="0" y="0"/>
+          <a:ext cx="0" cy="0"/>
+          <a:chOff x="0" y="0"/>
+          <a:chExt cx="0" cy="0"/>
+        </a:xfrm>
+      </p:grpSpPr>
+      <p:pic>
+        <p:nvPicPr>
+          <p:cNvPr id="11" name="Imagem 10">
+            <a:extLst>
+              <a:ext uri="{FF2B5EF4-FFF2-40B4-BE49-F238E27FC236}">
+                <a16:creationId xmlns:a16="http://schemas.microsoft.com/office/drawing/2014/main" id="{1BA5CE3A-4649-484C-A539-F7FBE27E7525}"/>
+              </a:ext>
+            </a:extLst>
+          </p:cNvPr>
+          <p:cNvPicPr>
+            <a:picLocks noChangeAspect="1"/>
+          </p:cNvPicPr>
+          <p:nvPr/>
+        </p:nvPicPr>
+        <p:blipFill>
+          <a:blip r:embed="rId2">
+            <a:extLst>
+              <a:ext uri="{28A0092B-C50C-407E-A947-70E740481C1C}">
+                <a14:useLocalDpi xmlns:a14="http://schemas.microsoft.com/office/drawing/2010/main" val="0"/>
+              </a:ext>
+            </a:extLst>
+          </a:blip>
+          <a:stretch>
+            <a:fillRect/>
+          </a:stretch>
+        </p:blipFill>
+        <p:spPr>
+          <a:xfrm>
+            <a:off x="0" y="0"/>
+            <a:ext cx="12192000" cy="6856286"/>
+          </a:xfrm>
+          <a:prstGeom prst="rect">
+            <a:avLst/>
+          </a:prstGeom>
+        </p:spPr>
+      </p:pic>
+      <p:sp>
+        <p:nvSpPr>
+          <p:cNvPr id="5" name="CaixaDeTexto 4">
+            <a:extLst>
+              <a:ext uri="{FF2B5EF4-FFF2-40B4-BE49-F238E27FC236}">
+                <a16:creationId xmlns:a16="http://schemas.microsoft.com/office/drawing/2014/main" id="{631F001F-A09F-46EC-B9EC-9DAA79ED2815}"/>
+              </a:ext>
+            </a:extLst>
+          </p:cNvPr>
+          <p:cNvSpPr txBox="1"/>
+          <p:nvPr/>
+        </p:nvSpPr>
+        <p:spPr>
+          <a:xfrm>
+            <a:off x="1981199" y="2271736"/>
+            <a:ext cx="8229602" cy="1446550"/>
+          </a:xfrm>
+          <a:prstGeom prst="rect">
+            <a:avLst/>
+          </a:prstGeom>
+          <a:noFill/>
+        </p:spPr>
+        <p:txBody>
+          <a:bodyPr wrap="square" rtlCol="0">
+            <a:spAutoFit/>
+          </a:bodyPr>
+          <a:lstStyle/>
+          <a:p>
+            <a:pPr algn="ctr"/>
+            <a:r>
+              <a:rPr lang="pt-BR" sz="8800" b="1" dirty="0">
+                <a:latin typeface="Roboto Th" pitchFamily="2" charset="0"/>
+                <a:ea typeface="Roboto Th" pitchFamily="2" charset="0"/>
+              </a:rPr>
+              <a:t>Agradecimentos</a:t>
+            </a:r>
+            <a:endParaRPr lang="pt-BR" sz="2400" b="1" dirty="0">
+              <a:latin typeface="Roboto Th" pitchFamily="2" charset="0"/>
+              <a:ea typeface="Roboto Th" pitchFamily="2" charset="0"/>
+            </a:endParaRPr>
+          </a:p>
+        </p:txBody>
+      </p:sp>
+      <p:sp>
+        <p:nvSpPr>
+          <p:cNvPr id="4" name="CaixaDeTexto 3">
+            <a:extLst>
+              <a:ext uri="{FF2B5EF4-FFF2-40B4-BE49-F238E27FC236}">
+                <a16:creationId xmlns:a16="http://schemas.microsoft.com/office/drawing/2014/main" id="{E8B511B2-4E3A-4D33-BA45-9560808A8D57}"/>
+              </a:ext>
+            </a:extLst>
+          </p:cNvPr>
+          <p:cNvSpPr txBox="1"/>
+          <p:nvPr/>
+        </p:nvSpPr>
+        <p:spPr>
+          <a:xfrm>
+            <a:off x="1981199" y="3623762"/>
+            <a:ext cx="8229602" cy="954107"/>
+          </a:xfrm>
+          <a:prstGeom prst="rect">
+            <a:avLst/>
+          </a:prstGeom>
+          <a:noFill/>
+        </p:spPr>
+        <p:txBody>
+          <a:bodyPr wrap="square" rtlCol="0">
+            <a:spAutoFit/>
+          </a:bodyPr>
+          <a:lstStyle/>
+          <a:p>
+            <a:pPr algn="ctr"/>
+            <a:r>
+              <a:rPr lang="pt-BR" sz="2800" b="1" dirty="0">
+                <a:latin typeface="Roboto Th" pitchFamily="2" charset="0"/>
+                <a:ea typeface="Roboto Th" pitchFamily="2" charset="0"/>
+              </a:rPr>
+              <a:t>Disponível em: https://github.com/Marcosnto/Projeto_IA---A-</a:t>
+            </a:r>
+            <a:endParaRPr lang="pt-BR" sz="700" b="1" dirty="0">
+              <a:latin typeface="Roboto Th" pitchFamily="2" charset="0"/>
+              <a:ea typeface="Roboto Th" pitchFamily="2" charset="0"/>
+            </a:endParaRPr>
+          </a:p>
+        </p:txBody>
+      </p:sp>
+    </p:spTree>
+    <p:extLst>
+      <p:ext uri="{BB962C8B-B14F-4D97-AF65-F5344CB8AC3E}">
+        <p14:creationId xmlns:p14="http://schemas.microsoft.com/office/powerpoint/2010/main" val="1809884459"/>
+      </p:ext>
+    </p:extLst>
+  </p:cSld>
+  <p:clrMapOvr>
+    <a:masterClrMapping/>
+  </p:clrMapOvr>
+  <mc:AlternateContent xmlns:mc="http://schemas.openxmlformats.org/markup-compatibility/2006" xmlns:p159="http://schemas.microsoft.com/office/powerpoint/2015/09/main">
+    <mc:Choice Requires="p159">
+      <p:transition xmlns:p14="http://schemas.microsoft.com/office/powerpoint/2010/main" spd="slow" p14:dur="2000">
+        <p159:morph option="byObject"/>
+      </p:transition>
+    </mc:Choice>
+    <mc:Fallback xmlns="">
+      <p:transition spd="slow">
+        <p:fade/>
+      </p:transition>
+    </mc:Fallback>
+  </mc:AlternateContent>
+  <p:timing>
+    <p:tnLst>
+      <p:par>
+        <p:cTn id="1" dur="indefinite" restart="never" nodeType="tmRoot">
+          <p:childTnLst>
+            <p:seq concurrent="1" nextAc="seek">
+              <p:cTn id="2" dur="indefinite" nodeType="mainSeq">
+                <p:childTnLst>
+                  <p:par>
+                    <p:cTn id="3" fill="hold">
+                      <p:stCondLst>
+                        <p:cond delay="indefinite"/>
+                      </p:stCondLst>
+                      <p:childTnLst>
+                        <p:par>
+                          <p:cTn id="4" fill="hold">
+                            <p:stCondLst>
+                              <p:cond delay="0"/>
+                            </p:stCondLst>
+                            <p:childTnLst>
+                              <p:par>
+                                <p:cTn id="5" presetID="10" presetClass="entr" presetSubtype="0" fill="hold" grpId="0" nodeType="clickEffect">
+                                  <p:stCondLst>
+                                    <p:cond delay="0"/>
+                                  </p:stCondLst>
+                                  <p:childTnLst>
+                                    <p:set>
+                                      <p:cBhvr>
+                                        <p:cTn id="6" dur="1" fill="hold">
+                                          <p:stCondLst>
+                                            <p:cond delay="0"/>
+                                          </p:stCondLst>
+                                        </p:cTn>
+                                        <p:tgtEl>
+                                          <p:spTgt spid="4"/>
+                                        </p:tgtEl>
+                                        <p:attrNameLst>
+                                          <p:attrName>style.visibility</p:attrName>
+                                        </p:attrNameLst>
+                                      </p:cBhvr>
+                                      <p:to>
+                                        <p:strVal val="visible"/>
+                                      </p:to>
+                                    </p:set>
+                                    <p:animEffect transition="in" filter="fade">
+                                      <p:cBhvr>
+                                        <p:cTn id="7" dur="500"/>
+                                        <p:tgtEl>
+                                          <p:spTgt spid="4"/>
+                                        </p:tgtEl>
+                                      </p:cBhvr>
+                                    </p:animEffect>
+                                  </p:childTnLst>
+                                </p:cTn>
+                              </p:par>
+                            </p:childTnLst>
+                          </p:cTn>
+                        </p:par>
+                      </p:childTnLst>
+                    </p:cTn>
+                  </p:par>
+                </p:childTnLst>
+              </p:cTn>
+              <p:prevCondLst>
+                <p:cond evt="onPrev" delay="0">
+                  <p:tgtEl>
+                    <p:sldTgt/>
+                  </p:tgtEl>
+                </p:cond>
+              </p:prevCondLst>
+              <p:nextCondLst>
+                <p:cond evt="onNext" delay="0">
+                  <p:tgtEl>
+                    <p:sldTgt/>
+                  </p:tgtEl>
+                </p:cond>
+              </p:nextCondLst>
+            </p:seq>
+          </p:childTnLst>
+        </p:cTn>
+      </p:par>
+    </p:tnLst>
+    <p:bldLst>
+      <p:bldP spid="4" grpId="0"/>
+    </p:bldLst>
+  </p:timing>
+</p:sld>
+</file>
+
 <file path=ppt/slides/slide3.xml><?xml version="1.0" encoding="utf-8"?>
 <p:sld xmlns:a="http://schemas.openxmlformats.org/drawingml/2006/main" xmlns:r="http://schemas.openxmlformats.org/officeDocument/2006/relationships" xmlns:p="http://schemas.openxmlformats.org/presentationml/2006/main">
   <p:cSld>
@@ -5441,7 +6873,7 @@
         </p:blipFill>
         <p:spPr>
           <a:xfrm>
-            <a:off x="0" y="0"/>
+            <a:off x="-58723" y="0"/>
             <a:ext cx="12192000" cy="6856286"/>
           </a:xfrm>
           <a:prstGeom prst="rect">
@@ -5499,6 +6931,51 @@
               <a:latin typeface="Roboto Th" pitchFamily="2" charset="0"/>
               <a:ea typeface="Roboto Th" pitchFamily="2" charset="0"/>
             </a:endParaRPr>
+          </a:p>
+        </p:txBody>
+      </p:sp>
+      <p:sp>
+        <p:nvSpPr>
+          <p:cNvPr id="9" name="Retângulo 8">
+            <a:extLst>
+              <a:ext uri="{FF2B5EF4-FFF2-40B4-BE49-F238E27FC236}">
+                <a16:creationId xmlns:a16="http://schemas.microsoft.com/office/drawing/2014/main" id="{1D308103-13F5-4398-9A24-3D1F1C4DC5BB}"/>
+              </a:ext>
+            </a:extLst>
+          </p:cNvPr>
+          <p:cNvSpPr/>
+          <p:nvPr/>
+        </p:nvSpPr>
+        <p:spPr>
+          <a:xfrm>
+            <a:off x="3959603" y="5334399"/>
+            <a:ext cx="4379053" cy="584775"/>
+          </a:xfrm>
+          <a:prstGeom prst="rect">
+            <a:avLst/>
+          </a:prstGeom>
+        </p:spPr>
+        <p:txBody>
+          <a:bodyPr wrap="square">
+            <a:spAutoFit/>
+          </a:bodyPr>
+          <a:lstStyle/>
+          <a:p>
+            <a:pPr algn="ctr"/>
+            <a:r>
+              <a:rPr lang="pt-BR" sz="3200" b="1" dirty="0">
+                <a:effectLst>
+                  <a:outerShdw blurRad="38100" dist="38100" dir="2700000" algn="tl">
+                    <a:srgbClr val="000000">
+                      <a:alpha val="43137"/>
+                    </a:srgbClr>
+                  </a:outerShdw>
+                </a:effectLst>
+                <a:latin typeface="Roboto Th" pitchFamily="2" charset="0"/>
+                <a:ea typeface="Roboto Th" pitchFamily="2" charset="0"/>
+              </a:rPr>
+              <a:t>F(x) = g(x) + h(x)</a:t>
+            </a:r>
           </a:p>
         </p:txBody>
       </p:sp>
@@ -5524,10 +7001,865 @@
       </p:transition>
     </mc:Fallback>
   </mc:AlternateContent>
+  <p:timing>
+    <p:tnLst>
+      <p:par>
+        <p:cTn id="1" dur="indefinite" restart="never" nodeType="tmRoot">
+          <p:childTnLst>
+            <p:seq concurrent="1" nextAc="seek">
+              <p:cTn id="2" dur="indefinite" nodeType="mainSeq">
+                <p:childTnLst>
+                  <p:par>
+                    <p:cTn id="3" fill="hold">
+                      <p:stCondLst>
+                        <p:cond delay="indefinite"/>
+                      </p:stCondLst>
+                      <p:childTnLst>
+                        <p:par>
+                          <p:cTn id="4" fill="hold">
+                            <p:stCondLst>
+                              <p:cond delay="0"/>
+                            </p:stCondLst>
+                            <p:childTnLst>
+                              <p:par>
+                                <p:cTn id="5" presetID="10" presetClass="entr" presetSubtype="0" fill="hold" grpId="0" nodeType="clickEffect">
+                                  <p:stCondLst>
+                                    <p:cond delay="0"/>
+                                  </p:stCondLst>
+                                  <p:childTnLst>
+                                    <p:set>
+                                      <p:cBhvr>
+                                        <p:cTn id="6" dur="1" fill="hold">
+                                          <p:stCondLst>
+                                            <p:cond delay="0"/>
+                                          </p:stCondLst>
+                                        </p:cTn>
+                                        <p:tgtEl>
+                                          <p:spTgt spid="9"/>
+                                        </p:tgtEl>
+                                        <p:attrNameLst>
+                                          <p:attrName>style.visibility</p:attrName>
+                                        </p:attrNameLst>
+                                      </p:cBhvr>
+                                      <p:to>
+                                        <p:strVal val="visible"/>
+                                      </p:to>
+                                    </p:set>
+                                    <p:animEffect transition="in" filter="fade">
+                                      <p:cBhvr>
+                                        <p:cTn id="7" dur="500"/>
+                                        <p:tgtEl>
+                                          <p:spTgt spid="9"/>
+                                        </p:tgtEl>
+                                      </p:cBhvr>
+                                    </p:animEffect>
+                                  </p:childTnLst>
+                                </p:cTn>
+                              </p:par>
+                            </p:childTnLst>
+                          </p:cTn>
+                        </p:par>
+                      </p:childTnLst>
+                    </p:cTn>
+                  </p:par>
+                </p:childTnLst>
+              </p:cTn>
+              <p:prevCondLst>
+                <p:cond evt="onPrev" delay="0">
+                  <p:tgtEl>
+                    <p:sldTgt/>
+                  </p:tgtEl>
+                </p:cond>
+              </p:prevCondLst>
+              <p:nextCondLst>
+                <p:cond evt="onNext" delay="0">
+                  <p:tgtEl>
+                    <p:sldTgt/>
+                  </p:tgtEl>
+                </p:cond>
+              </p:nextCondLst>
+            </p:seq>
+          </p:childTnLst>
+        </p:cTn>
+      </p:par>
+    </p:tnLst>
+    <p:bldLst>
+      <p:bldP spid="9" grpId="0"/>
+    </p:bldLst>
+  </p:timing>
 </p:sld>
 </file>
 
 <file path=ppt/slides/slide4.xml><?xml version="1.0" encoding="utf-8"?>
+<p:sld xmlns:a="http://schemas.openxmlformats.org/drawingml/2006/main" xmlns:r="http://schemas.openxmlformats.org/officeDocument/2006/relationships" xmlns:p="http://schemas.openxmlformats.org/presentationml/2006/main">
+  <p:cSld>
+    <p:spTree>
+      <p:nvGrpSpPr>
+        <p:cNvPr id="1" name=""/>
+        <p:cNvGrpSpPr/>
+        <p:nvPr/>
+      </p:nvGrpSpPr>
+      <p:grpSpPr>
+        <a:xfrm>
+          <a:off x="0" y="0"/>
+          <a:ext cx="0" cy="0"/>
+          <a:chOff x="0" y="0"/>
+          <a:chExt cx="0" cy="0"/>
+        </a:xfrm>
+      </p:grpSpPr>
+      <p:pic>
+        <p:nvPicPr>
+          <p:cNvPr id="11" name="Imagem 10">
+            <a:extLst>
+              <a:ext uri="{FF2B5EF4-FFF2-40B4-BE49-F238E27FC236}">
+                <a16:creationId xmlns:a16="http://schemas.microsoft.com/office/drawing/2014/main" id="{1BA5CE3A-4649-484C-A539-F7FBE27E7525}"/>
+              </a:ext>
+            </a:extLst>
+          </p:cNvPr>
+          <p:cNvPicPr>
+            <a:picLocks noChangeAspect="1"/>
+          </p:cNvPicPr>
+          <p:nvPr/>
+        </p:nvPicPr>
+        <p:blipFill>
+          <a:blip r:embed="rId2">
+            <a:extLst>
+              <a:ext uri="{28A0092B-C50C-407E-A947-70E740481C1C}">
+                <a14:useLocalDpi xmlns:a14="http://schemas.microsoft.com/office/drawing/2010/main" val="0"/>
+              </a:ext>
+            </a:extLst>
+          </a:blip>
+          <a:stretch>
+            <a:fillRect/>
+          </a:stretch>
+        </p:blipFill>
+        <p:spPr>
+          <a:xfrm>
+            <a:off x="0" y="1714"/>
+            <a:ext cx="12192000" cy="6856286"/>
+          </a:xfrm>
+          <a:prstGeom prst="rect">
+            <a:avLst/>
+          </a:prstGeom>
+        </p:spPr>
+      </p:pic>
+      <p:pic>
+        <p:nvPicPr>
+          <p:cNvPr id="5" name="Imagem 4">
+            <a:extLst>
+              <a:ext uri="{FF2B5EF4-FFF2-40B4-BE49-F238E27FC236}">
+                <a16:creationId xmlns:a16="http://schemas.microsoft.com/office/drawing/2014/main" id="{514061D3-32D5-4B76-B954-675058A3971C}"/>
+              </a:ext>
+            </a:extLst>
+          </p:cNvPr>
+          <p:cNvPicPr>
+            <a:picLocks noChangeAspect="1"/>
+          </p:cNvPicPr>
+          <p:nvPr/>
+        </p:nvPicPr>
+        <p:blipFill>
+          <a:blip r:embed="rId3">
+            <a:extLst>
+              <a:ext uri="{28A0092B-C50C-407E-A947-70E740481C1C}">
+                <a14:useLocalDpi xmlns:a14="http://schemas.microsoft.com/office/drawing/2010/main" val="0"/>
+              </a:ext>
+            </a:extLst>
+          </a:blip>
+          <a:stretch>
+            <a:fillRect/>
+          </a:stretch>
+        </p:blipFill>
+        <p:spPr>
+          <a:xfrm>
+            <a:off x="1942609" y="1176287"/>
+            <a:ext cx="3373338" cy="2618260"/>
+          </a:xfrm>
+          <a:prstGeom prst="rect">
+            <a:avLst/>
+          </a:prstGeom>
+        </p:spPr>
+      </p:pic>
+      <p:pic>
+        <p:nvPicPr>
+          <p:cNvPr id="7" name="Imagem 6">
+            <a:extLst>
+              <a:ext uri="{FF2B5EF4-FFF2-40B4-BE49-F238E27FC236}">
+                <a16:creationId xmlns:a16="http://schemas.microsoft.com/office/drawing/2014/main" id="{BE2C51B3-ACF9-4F8B-B203-F698B2559699}"/>
+              </a:ext>
+            </a:extLst>
+          </p:cNvPr>
+          <p:cNvPicPr>
+            <a:picLocks noChangeAspect="1"/>
+          </p:cNvPicPr>
+          <p:nvPr/>
+        </p:nvPicPr>
+        <p:blipFill>
+          <a:blip r:embed="rId4">
+            <a:extLst>
+              <a:ext uri="{28A0092B-C50C-407E-A947-70E740481C1C}">
+                <a14:useLocalDpi xmlns:a14="http://schemas.microsoft.com/office/drawing/2010/main" val="0"/>
+              </a:ext>
+            </a:extLst>
+          </a:blip>
+          <a:stretch>
+            <a:fillRect/>
+          </a:stretch>
+        </p:blipFill>
+        <p:spPr>
+          <a:xfrm>
+            <a:off x="4153167" y="1233181"/>
+            <a:ext cx="1856026" cy="2571369"/>
+          </a:xfrm>
+          <a:prstGeom prst="rect">
+            <a:avLst/>
+          </a:prstGeom>
+        </p:spPr>
+      </p:pic>
+      <p:pic>
+        <p:nvPicPr>
+          <p:cNvPr id="9" name="Imagem 8">
+            <a:extLst>
+              <a:ext uri="{FF2B5EF4-FFF2-40B4-BE49-F238E27FC236}">
+                <a16:creationId xmlns:a16="http://schemas.microsoft.com/office/drawing/2014/main" id="{B85BC6F4-8F30-4F45-9BD3-4DF0D790E571}"/>
+              </a:ext>
+            </a:extLst>
+          </p:cNvPr>
+          <p:cNvPicPr>
+            <a:picLocks noChangeAspect="1"/>
+          </p:cNvPicPr>
+          <p:nvPr/>
+        </p:nvPicPr>
+        <p:blipFill>
+          <a:blip r:embed="rId5">
+            <a:extLst>
+              <a:ext uri="{28A0092B-C50C-407E-A947-70E740481C1C}">
+                <a14:useLocalDpi xmlns:a14="http://schemas.microsoft.com/office/drawing/2010/main" val="0"/>
+              </a:ext>
+            </a:extLst>
+          </a:blip>
+          <a:stretch>
+            <a:fillRect/>
+          </a:stretch>
+        </p:blipFill>
+        <p:spPr>
+          <a:xfrm>
+            <a:off x="6125713" y="1221213"/>
+            <a:ext cx="1971494" cy="2583337"/>
+          </a:xfrm>
+          <a:prstGeom prst="rect">
+            <a:avLst/>
+          </a:prstGeom>
+        </p:spPr>
+      </p:pic>
+      <p:pic>
+        <p:nvPicPr>
+          <p:cNvPr id="12" name="Imagem 11">
+            <a:extLst>
+              <a:ext uri="{FF2B5EF4-FFF2-40B4-BE49-F238E27FC236}">
+                <a16:creationId xmlns:a16="http://schemas.microsoft.com/office/drawing/2014/main" id="{DE5A3767-4E1C-43F5-8525-7F92402DFEB2}"/>
+              </a:ext>
+            </a:extLst>
+          </p:cNvPr>
+          <p:cNvPicPr>
+            <a:picLocks noChangeAspect="1"/>
+          </p:cNvPicPr>
+          <p:nvPr/>
+        </p:nvPicPr>
+        <p:blipFill>
+          <a:blip r:embed="rId6">
+            <a:extLst>
+              <a:ext uri="{28A0092B-C50C-407E-A947-70E740481C1C}">
+                <a14:useLocalDpi xmlns:a14="http://schemas.microsoft.com/office/drawing/2010/main" val="0"/>
+              </a:ext>
+            </a:extLst>
+          </a:blip>
+          <a:stretch>
+            <a:fillRect/>
+          </a:stretch>
+        </p:blipFill>
+        <p:spPr>
+          <a:xfrm>
+            <a:off x="6688230" y="1221212"/>
+            <a:ext cx="3757581" cy="2583337"/>
+          </a:xfrm>
+          <a:prstGeom prst="rect">
+            <a:avLst/>
+          </a:prstGeom>
+        </p:spPr>
+      </p:pic>
+      <p:pic>
+        <p:nvPicPr>
+          <p:cNvPr id="15" name="Imagem 14">
+            <a:extLst>
+              <a:ext uri="{FF2B5EF4-FFF2-40B4-BE49-F238E27FC236}">
+                <a16:creationId xmlns:a16="http://schemas.microsoft.com/office/drawing/2014/main" id="{3C191B74-9AD3-489E-87C3-A1D655E52E46}"/>
+              </a:ext>
+            </a:extLst>
+          </p:cNvPr>
+          <p:cNvPicPr>
+            <a:picLocks noChangeAspect="1"/>
+          </p:cNvPicPr>
+          <p:nvPr/>
+        </p:nvPicPr>
+        <p:blipFill>
+          <a:blip r:embed="rId7">
+            <a:extLst>
+              <a:ext uri="{28A0092B-C50C-407E-A947-70E740481C1C}">
+                <a14:useLocalDpi xmlns:a14="http://schemas.microsoft.com/office/drawing/2010/main" val="0"/>
+              </a:ext>
+            </a:extLst>
+          </a:blip>
+          <a:stretch>
+            <a:fillRect/>
+          </a:stretch>
+        </p:blipFill>
+        <p:spPr>
+          <a:xfrm>
+            <a:off x="2493442" y="3786340"/>
+            <a:ext cx="2271671" cy="2604589"/>
+          </a:xfrm>
+          <a:prstGeom prst="rect">
+            <a:avLst/>
+          </a:prstGeom>
+        </p:spPr>
+      </p:pic>
+      <p:pic>
+        <p:nvPicPr>
+          <p:cNvPr id="19" name="Imagem 18">
+            <a:extLst>
+              <a:ext uri="{FF2B5EF4-FFF2-40B4-BE49-F238E27FC236}">
+                <a16:creationId xmlns:a16="http://schemas.microsoft.com/office/drawing/2014/main" id="{048CE62B-E300-44D8-BF7B-5BD46D3E8832}"/>
+              </a:ext>
+            </a:extLst>
+          </p:cNvPr>
+          <p:cNvPicPr>
+            <a:picLocks noChangeAspect="1"/>
+          </p:cNvPicPr>
+          <p:nvPr/>
+        </p:nvPicPr>
+        <p:blipFill>
+          <a:blip r:embed="rId8">
+            <a:extLst>
+              <a:ext uri="{28A0092B-C50C-407E-A947-70E740481C1C}">
+                <a14:useLocalDpi xmlns:a14="http://schemas.microsoft.com/office/drawing/2010/main" val="0"/>
+              </a:ext>
+            </a:extLst>
+          </a:blip>
+          <a:stretch>
+            <a:fillRect/>
+          </a:stretch>
+        </p:blipFill>
+        <p:spPr>
+          <a:xfrm>
+            <a:off x="5006732" y="3794547"/>
+            <a:ext cx="2500341" cy="2578172"/>
+          </a:xfrm>
+          <a:prstGeom prst="rect">
+            <a:avLst/>
+          </a:prstGeom>
+        </p:spPr>
+      </p:pic>
+      <p:pic>
+        <p:nvPicPr>
+          <p:cNvPr id="21" name="Imagem 20">
+            <a:extLst>
+              <a:ext uri="{FF2B5EF4-FFF2-40B4-BE49-F238E27FC236}">
+                <a16:creationId xmlns:a16="http://schemas.microsoft.com/office/drawing/2014/main" id="{7BC5B6D9-5381-4D7E-9503-4B5052FF4BB0}"/>
+              </a:ext>
+            </a:extLst>
+          </p:cNvPr>
+          <p:cNvPicPr>
+            <a:picLocks noChangeAspect="1"/>
+          </p:cNvPicPr>
+          <p:nvPr/>
+        </p:nvPicPr>
+        <p:blipFill>
+          <a:blip r:embed="rId9">
+            <a:extLst>
+              <a:ext uri="{28A0092B-C50C-407E-A947-70E740481C1C}">
+                <a14:useLocalDpi xmlns:a14="http://schemas.microsoft.com/office/drawing/2010/main" val="0"/>
+              </a:ext>
+            </a:extLst>
+          </a:blip>
+          <a:stretch>
+            <a:fillRect/>
+          </a:stretch>
+        </p:blipFill>
+        <p:spPr>
+          <a:xfrm>
+            <a:off x="4643601" y="189634"/>
+            <a:ext cx="2737384" cy="1113128"/>
+          </a:xfrm>
+          <a:prstGeom prst="rect">
+            <a:avLst/>
+          </a:prstGeom>
+        </p:spPr>
+      </p:pic>
+      <p:sp>
+        <p:nvSpPr>
+          <p:cNvPr id="22" name="Retângulo 21">
+            <a:extLst>
+              <a:ext uri="{FF2B5EF4-FFF2-40B4-BE49-F238E27FC236}">
+                <a16:creationId xmlns:a16="http://schemas.microsoft.com/office/drawing/2014/main" id="{EFEB5E5E-77CA-4CE1-9F57-AB178AEE42CC}"/>
+              </a:ext>
+            </a:extLst>
+          </p:cNvPr>
+          <p:cNvSpPr/>
+          <p:nvPr/>
+        </p:nvSpPr>
+        <p:spPr>
+          <a:xfrm>
+            <a:off x="8097207" y="5152748"/>
+            <a:ext cx="3789993" cy="830997"/>
+          </a:xfrm>
+          <a:prstGeom prst="rect">
+            <a:avLst/>
+          </a:prstGeom>
+        </p:spPr>
+        <p:txBody>
+          <a:bodyPr wrap="square">
+            <a:spAutoFit/>
+          </a:bodyPr>
+          <a:lstStyle/>
+          <a:p>
+            <a:pPr algn="ctr"/>
+            <a:r>
+              <a:rPr lang="pt-BR" sz="2400" b="1" dirty="0">
+                <a:latin typeface="Roboto Th" pitchFamily="2" charset="0"/>
+                <a:ea typeface="Roboto Th" pitchFamily="2" charset="0"/>
+              </a:rPr>
+              <a:t>Exemplo com arvore: Itabaiana - Ribeirópolis</a:t>
+            </a:r>
+          </a:p>
+        </p:txBody>
+      </p:sp>
+    </p:spTree>
+    <p:extLst>
+      <p:ext uri="{BB962C8B-B14F-4D97-AF65-F5344CB8AC3E}">
+        <p14:creationId xmlns:p14="http://schemas.microsoft.com/office/powerpoint/2010/main" val="386857468"/>
+      </p:ext>
+    </p:extLst>
+  </p:cSld>
+  <p:clrMapOvr>
+    <a:masterClrMapping/>
+  </p:clrMapOvr>
+  <mc:AlternateContent xmlns:mc="http://schemas.openxmlformats.org/markup-compatibility/2006" xmlns:p159="http://schemas.microsoft.com/office/powerpoint/2015/09/main">
+    <mc:Choice Requires="p159">
+      <p:transition xmlns:p14="http://schemas.microsoft.com/office/powerpoint/2010/main" spd="slow" p14:dur="2000">
+        <p159:morph option="byObject"/>
+      </p:transition>
+    </mc:Choice>
+    <mc:Fallback xmlns="">
+      <p:transition spd="slow">
+        <p:fade/>
+      </p:transition>
+    </mc:Fallback>
+  </mc:AlternateContent>
+  <p:timing>
+    <p:tnLst>
+      <p:par>
+        <p:cTn id="1" dur="indefinite" restart="never" nodeType="tmRoot">
+          <p:childTnLst>
+            <p:seq concurrent="1" nextAc="seek">
+              <p:cTn id="2" dur="indefinite" nodeType="mainSeq">
+                <p:childTnLst>
+                  <p:par>
+                    <p:cTn id="3" fill="hold">
+                      <p:stCondLst>
+                        <p:cond delay="indefinite"/>
+                      </p:stCondLst>
+                      <p:childTnLst>
+                        <p:par>
+                          <p:cTn id="4" fill="hold">
+                            <p:stCondLst>
+                              <p:cond delay="0"/>
+                            </p:stCondLst>
+                            <p:childTnLst>
+                              <p:par>
+                                <p:cTn id="5" presetID="10" presetClass="entr" presetSubtype="0" fill="hold" nodeType="clickEffect">
+                                  <p:stCondLst>
+                                    <p:cond delay="0"/>
+                                  </p:stCondLst>
+                                  <p:childTnLst>
+                                    <p:set>
+                                      <p:cBhvr>
+                                        <p:cTn id="6" dur="1" fill="hold">
+                                          <p:stCondLst>
+                                            <p:cond delay="0"/>
+                                          </p:stCondLst>
+                                        </p:cTn>
+                                        <p:tgtEl>
+                                          <p:spTgt spid="21"/>
+                                        </p:tgtEl>
+                                        <p:attrNameLst>
+                                          <p:attrName>style.visibility</p:attrName>
+                                        </p:attrNameLst>
+                                      </p:cBhvr>
+                                      <p:to>
+                                        <p:strVal val="visible"/>
+                                      </p:to>
+                                    </p:set>
+                                    <p:animEffect transition="in" filter="fade">
+                                      <p:cBhvr>
+                                        <p:cTn id="7" dur="500"/>
+                                        <p:tgtEl>
+                                          <p:spTgt spid="21"/>
+                                        </p:tgtEl>
+                                      </p:cBhvr>
+                                    </p:animEffect>
+                                  </p:childTnLst>
+                                </p:cTn>
+                              </p:par>
+                            </p:childTnLst>
+                          </p:cTn>
+                        </p:par>
+                      </p:childTnLst>
+                    </p:cTn>
+                  </p:par>
+                  <p:par>
+                    <p:cTn id="8" fill="hold">
+                      <p:stCondLst>
+                        <p:cond delay="indefinite"/>
+                      </p:stCondLst>
+                      <p:childTnLst>
+                        <p:par>
+                          <p:cTn id="9" fill="hold">
+                            <p:stCondLst>
+                              <p:cond delay="0"/>
+                            </p:stCondLst>
+                            <p:childTnLst>
+                              <p:par>
+                                <p:cTn id="10" presetID="10" presetClass="entr" presetSubtype="0" fill="hold" nodeType="clickEffect">
+                                  <p:stCondLst>
+                                    <p:cond delay="0"/>
+                                  </p:stCondLst>
+                                  <p:childTnLst>
+                                    <p:set>
+                                      <p:cBhvr>
+                                        <p:cTn id="11" dur="1" fill="hold">
+                                          <p:stCondLst>
+                                            <p:cond delay="0"/>
+                                          </p:stCondLst>
+                                        </p:cTn>
+                                        <p:tgtEl>
+                                          <p:spTgt spid="5"/>
+                                        </p:tgtEl>
+                                        <p:attrNameLst>
+                                          <p:attrName>style.visibility</p:attrName>
+                                        </p:attrNameLst>
+                                      </p:cBhvr>
+                                      <p:to>
+                                        <p:strVal val="visible"/>
+                                      </p:to>
+                                    </p:set>
+                                    <p:animEffect transition="in" filter="fade">
+                                      <p:cBhvr>
+                                        <p:cTn id="12" dur="500"/>
+                                        <p:tgtEl>
+                                          <p:spTgt spid="5"/>
+                                        </p:tgtEl>
+                                      </p:cBhvr>
+                                    </p:animEffect>
+                                  </p:childTnLst>
+                                </p:cTn>
+                              </p:par>
+                            </p:childTnLst>
+                          </p:cTn>
+                        </p:par>
+                      </p:childTnLst>
+                    </p:cTn>
+                  </p:par>
+                  <p:par>
+                    <p:cTn id="13" fill="hold">
+                      <p:stCondLst>
+                        <p:cond delay="indefinite"/>
+                      </p:stCondLst>
+                      <p:childTnLst>
+                        <p:par>
+                          <p:cTn id="14" fill="hold">
+                            <p:stCondLst>
+                              <p:cond delay="0"/>
+                            </p:stCondLst>
+                            <p:childTnLst>
+                              <p:par>
+                                <p:cTn id="15" presetID="10" presetClass="entr" presetSubtype="0" fill="hold" nodeType="clickEffect">
+                                  <p:stCondLst>
+                                    <p:cond delay="0"/>
+                                  </p:stCondLst>
+                                  <p:childTnLst>
+                                    <p:set>
+                                      <p:cBhvr>
+                                        <p:cTn id="16" dur="1" fill="hold">
+                                          <p:stCondLst>
+                                            <p:cond delay="0"/>
+                                          </p:stCondLst>
+                                        </p:cTn>
+                                        <p:tgtEl>
+                                          <p:spTgt spid="7"/>
+                                        </p:tgtEl>
+                                        <p:attrNameLst>
+                                          <p:attrName>style.visibility</p:attrName>
+                                        </p:attrNameLst>
+                                      </p:cBhvr>
+                                      <p:to>
+                                        <p:strVal val="visible"/>
+                                      </p:to>
+                                    </p:set>
+                                    <p:animEffect transition="in" filter="fade">
+                                      <p:cBhvr>
+                                        <p:cTn id="17" dur="500"/>
+                                        <p:tgtEl>
+                                          <p:spTgt spid="7"/>
+                                        </p:tgtEl>
+                                      </p:cBhvr>
+                                    </p:animEffect>
+                                  </p:childTnLst>
+                                </p:cTn>
+                              </p:par>
+                            </p:childTnLst>
+                          </p:cTn>
+                        </p:par>
+                      </p:childTnLst>
+                    </p:cTn>
+                  </p:par>
+                  <p:par>
+                    <p:cTn id="18" fill="hold">
+                      <p:stCondLst>
+                        <p:cond delay="indefinite"/>
+                      </p:stCondLst>
+                      <p:childTnLst>
+                        <p:par>
+                          <p:cTn id="19" fill="hold">
+                            <p:stCondLst>
+                              <p:cond delay="0"/>
+                            </p:stCondLst>
+                            <p:childTnLst>
+                              <p:par>
+                                <p:cTn id="20" presetID="10" presetClass="entr" presetSubtype="0" fill="hold" nodeType="clickEffect">
+                                  <p:stCondLst>
+                                    <p:cond delay="0"/>
+                                  </p:stCondLst>
+                                  <p:childTnLst>
+                                    <p:set>
+                                      <p:cBhvr>
+                                        <p:cTn id="21" dur="1" fill="hold">
+                                          <p:stCondLst>
+                                            <p:cond delay="0"/>
+                                          </p:stCondLst>
+                                        </p:cTn>
+                                        <p:tgtEl>
+                                          <p:spTgt spid="9"/>
+                                        </p:tgtEl>
+                                        <p:attrNameLst>
+                                          <p:attrName>style.visibility</p:attrName>
+                                        </p:attrNameLst>
+                                      </p:cBhvr>
+                                      <p:to>
+                                        <p:strVal val="visible"/>
+                                      </p:to>
+                                    </p:set>
+                                    <p:animEffect transition="in" filter="fade">
+                                      <p:cBhvr>
+                                        <p:cTn id="22" dur="500"/>
+                                        <p:tgtEl>
+                                          <p:spTgt spid="9"/>
+                                        </p:tgtEl>
+                                      </p:cBhvr>
+                                    </p:animEffect>
+                                  </p:childTnLst>
+                                </p:cTn>
+                              </p:par>
+                            </p:childTnLst>
+                          </p:cTn>
+                        </p:par>
+                      </p:childTnLst>
+                    </p:cTn>
+                  </p:par>
+                  <p:par>
+                    <p:cTn id="23" fill="hold">
+                      <p:stCondLst>
+                        <p:cond delay="indefinite"/>
+                      </p:stCondLst>
+                      <p:childTnLst>
+                        <p:par>
+                          <p:cTn id="24" fill="hold">
+                            <p:stCondLst>
+                              <p:cond delay="0"/>
+                            </p:stCondLst>
+                            <p:childTnLst>
+                              <p:par>
+                                <p:cTn id="25" presetID="10" presetClass="entr" presetSubtype="0" fill="hold" nodeType="clickEffect">
+                                  <p:stCondLst>
+                                    <p:cond delay="0"/>
+                                  </p:stCondLst>
+                                  <p:childTnLst>
+                                    <p:set>
+                                      <p:cBhvr>
+                                        <p:cTn id="26" dur="1" fill="hold">
+                                          <p:stCondLst>
+                                            <p:cond delay="0"/>
+                                          </p:stCondLst>
+                                        </p:cTn>
+                                        <p:tgtEl>
+                                          <p:spTgt spid="12"/>
+                                        </p:tgtEl>
+                                        <p:attrNameLst>
+                                          <p:attrName>style.visibility</p:attrName>
+                                        </p:attrNameLst>
+                                      </p:cBhvr>
+                                      <p:to>
+                                        <p:strVal val="visible"/>
+                                      </p:to>
+                                    </p:set>
+                                    <p:animEffect transition="in" filter="fade">
+                                      <p:cBhvr>
+                                        <p:cTn id="27" dur="500"/>
+                                        <p:tgtEl>
+                                          <p:spTgt spid="12"/>
+                                        </p:tgtEl>
+                                      </p:cBhvr>
+                                    </p:animEffect>
+                                  </p:childTnLst>
+                                </p:cTn>
+                              </p:par>
+                            </p:childTnLst>
+                          </p:cTn>
+                        </p:par>
+                      </p:childTnLst>
+                    </p:cTn>
+                  </p:par>
+                  <p:par>
+                    <p:cTn id="28" fill="hold">
+                      <p:stCondLst>
+                        <p:cond delay="indefinite"/>
+                      </p:stCondLst>
+                      <p:childTnLst>
+                        <p:par>
+                          <p:cTn id="29" fill="hold">
+                            <p:stCondLst>
+                              <p:cond delay="0"/>
+                            </p:stCondLst>
+                            <p:childTnLst>
+                              <p:par>
+                                <p:cTn id="30" presetID="10" presetClass="entr" presetSubtype="0" fill="hold" nodeType="clickEffect">
+                                  <p:stCondLst>
+                                    <p:cond delay="0"/>
+                                  </p:stCondLst>
+                                  <p:childTnLst>
+                                    <p:set>
+                                      <p:cBhvr>
+                                        <p:cTn id="31" dur="1" fill="hold">
+                                          <p:stCondLst>
+                                            <p:cond delay="0"/>
+                                          </p:stCondLst>
+                                        </p:cTn>
+                                        <p:tgtEl>
+                                          <p:spTgt spid="15"/>
+                                        </p:tgtEl>
+                                        <p:attrNameLst>
+                                          <p:attrName>style.visibility</p:attrName>
+                                        </p:attrNameLst>
+                                      </p:cBhvr>
+                                      <p:to>
+                                        <p:strVal val="visible"/>
+                                      </p:to>
+                                    </p:set>
+                                    <p:animEffect transition="in" filter="fade">
+                                      <p:cBhvr>
+                                        <p:cTn id="32" dur="500"/>
+                                        <p:tgtEl>
+                                          <p:spTgt spid="15"/>
+                                        </p:tgtEl>
+                                      </p:cBhvr>
+                                    </p:animEffect>
+                                  </p:childTnLst>
+                                </p:cTn>
+                              </p:par>
+                            </p:childTnLst>
+                          </p:cTn>
+                        </p:par>
+                      </p:childTnLst>
+                    </p:cTn>
+                  </p:par>
+                  <p:par>
+                    <p:cTn id="33" fill="hold">
+                      <p:stCondLst>
+                        <p:cond delay="indefinite"/>
+                      </p:stCondLst>
+                      <p:childTnLst>
+                        <p:par>
+                          <p:cTn id="34" fill="hold">
+                            <p:stCondLst>
+                              <p:cond delay="0"/>
+                            </p:stCondLst>
+                            <p:childTnLst>
+                              <p:par>
+                                <p:cTn id="35" presetID="10" presetClass="entr" presetSubtype="0" fill="hold" nodeType="clickEffect">
+                                  <p:stCondLst>
+                                    <p:cond delay="0"/>
+                                  </p:stCondLst>
+                                  <p:childTnLst>
+                                    <p:set>
+                                      <p:cBhvr>
+                                        <p:cTn id="36" dur="1" fill="hold">
+                                          <p:stCondLst>
+                                            <p:cond delay="0"/>
+                                          </p:stCondLst>
+                                        </p:cTn>
+                                        <p:tgtEl>
+                                          <p:spTgt spid="19"/>
+                                        </p:tgtEl>
+                                        <p:attrNameLst>
+                                          <p:attrName>style.visibility</p:attrName>
+                                        </p:attrNameLst>
+                                      </p:cBhvr>
+                                      <p:to>
+                                        <p:strVal val="visible"/>
+                                      </p:to>
+                                    </p:set>
+                                    <p:animEffect transition="in" filter="fade">
+                                      <p:cBhvr>
+                                        <p:cTn id="37" dur="500"/>
+                                        <p:tgtEl>
+                                          <p:spTgt spid="19"/>
+                                        </p:tgtEl>
+                                      </p:cBhvr>
+                                    </p:animEffect>
+                                  </p:childTnLst>
+                                </p:cTn>
+                              </p:par>
+                            </p:childTnLst>
+                          </p:cTn>
+                        </p:par>
+                      </p:childTnLst>
+                    </p:cTn>
+                  </p:par>
+                </p:childTnLst>
+              </p:cTn>
+              <p:prevCondLst>
+                <p:cond evt="onPrev" delay="0">
+                  <p:tgtEl>
+                    <p:sldTgt/>
+                  </p:tgtEl>
+                </p:cond>
+              </p:prevCondLst>
+              <p:nextCondLst>
+                <p:cond evt="onNext" delay="0">
+                  <p:tgtEl>
+                    <p:sldTgt/>
+                  </p:tgtEl>
+                </p:cond>
+              </p:nextCondLst>
+            </p:seq>
+          </p:childTnLst>
+        </p:cTn>
+      </p:par>
+    </p:tnLst>
+  </p:timing>
+</p:sld>
+</file>
+
+<file path=ppt/slides/slide5.xml><?xml version="1.0" encoding="utf-8"?>
 <p:sld xmlns:a="http://schemas.openxmlformats.org/drawingml/2006/main" xmlns:r="http://schemas.openxmlformats.org/officeDocument/2006/relationships" xmlns:p="http://schemas.openxmlformats.org/presentationml/2006/main">
   <p:cSld>
     <p:spTree>
@@ -5780,7 +8112,7 @@
 </p:sld>
 </file>
 
-<file path=ppt/slides/slide5.xml><?xml version="1.0" encoding="utf-8"?>
+<file path=ppt/slides/slide6.xml><?xml version="1.0" encoding="utf-8"?>
 <p:sld xmlns:a="http://schemas.openxmlformats.org/drawingml/2006/main" xmlns:r="http://schemas.openxmlformats.org/officeDocument/2006/relationships" xmlns:p="http://schemas.openxmlformats.org/presentationml/2006/main">
   <p:cSld>
     <p:spTree>
@@ -5858,7 +8190,7 @@
 </p:sld>
 </file>
 
-<file path=ppt/slides/slide6.xml><?xml version="1.0" encoding="utf-8"?>
+<file path=ppt/slides/slide7.xml><?xml version="1.0" encoding="utf-8"?>
 <p:sld xmlns:a="http://schemas.openxmlformats.org/drawingml/2006/main" xmlns:r="http://schemas.openxmlformats.org/officeDocument/2006/relationships" xmlns:p="http://schemas.openxmlformats.org/presentationml/2006/main">
   <p:cSld>
     <p:spTree>
@@ -5936,7 +8268,7 @@
 </p:sld>
 </file>
 
-<file path=ppt/slides/slide7.xml><?xml version="1.0" encoding="utf-8"?>
+<file path=ppt/slides/slide8.xml><?xml version="1.0" encoding="utf-8"?>
 <p:sld xmlns:a="http://schemas.openxmlformats.org/drawingml/2006/main" xmlns:r="http://schemas.openxmlformats.org/officeDocument/2006/relationships" xmlns:p="http://schemas.openxmlformats.org/presentationml/2006/main">
   <p:cSld>
     <p:spTree>
@@ -5999,92 +8331,14 @@
   <p:clrMapOvr>
     <a:masterClrMapping/>
   </p:clrMapOvr>
-  <mc:AlternateContent xmlns:mc="http://schemas.openxmlformats.org/markup-compatibility/2006" xmlns:p14="http://schemas.microsoft.com/office/powerpoint/2010/main">
-    <mc:Choice Requires="p14">
-      <p:transition spd="med" p14:dur="700">
-        <p:fade/>
+  <mc:AlternateContent xmlns:mc="http://schemas.openxmlformats.org/markup-compatibility/2006">
+    <mc:Choice xmlns:p159="http://schemas.microsoft.com/office/powerpoint/2015/09/main" Requires="p159">
+      <p:transition xmlns:p14="http://schemas.microsoft.com/office/powerpoint/2010/main" spd="slow" p14:dur="2000">
+        <p159:morph option="byObject"/>
       </p:transition>
     </mc:Choice>
-    <mc:Fallback xmlns="">
-      <p:transition spd="med">
-        <p:fade/>
-      </p:transition>
-    </mc:Fallback>
-  </mc:AlternateContent>
-</p:sld>
-</file>
-
-<file path=ppt/slides/slide8.xml><?xml version="1.0" encoding="utf-8"?>
-<p:sld xmlns:a="http://schemas.openxmlformats.org/drawingml/2006/main" xmlns:r="http://schemas.openxmlformats.org/officeDocument/2006/relationships" xmlns:p="http://schemas.openxmlformats.org/presentationml/2006/main">
-  <p:cSld>
-    <p:spTree>
-      <p:nvGrpSpPr>
-        <p:cNvPr id="1" name=""/>
-        <p:cNvGrpSpPr/>
-        <p:nvPr/>
-      </p:nvGrpSpPr>
-      <p:grpSpPr>
-        <a:xfrm>
-          <a:off x="0" y="0"/>
-          <a:ext cx="0" cy="0"/>
-          <a:chOff x="0" y="0"/>
-          <a:chExt cx="0" cy="0"/>
-        </a:xfrm>
-      </p:grpSpPr>
-      <p:pic>
-        <p:nvPicPr>
-          <p:cNvPr id="5" name="Imagem 4" descr="Uma imagem contendo texto, mapa&#10;&#10;Descrição gerada com muito alta confiança">
-            <a:extLst>
-              <a:ext uri="{FF2B5EF4-FFF2-40B4-BE49-F238E27FC236}">
-                <a16:creationId xmlns:a16="http://schemas.microsoft.com/office/drawing/2014/main" id="{5345386B-DCF3-4359-8130-6872DDCB2390}"/>
-              </a:ext>
-            </a:extLst>
-          </p:cNvPr>
-          <p:cNvPicPr>
-            <a:picLocks noChangeAspect="1"/>
-          </p:cNvPicPr>
-          <p:nvPr/>
-        </p:nvPicPr>
-        <p:blipFill>
-          <a:blip r:embed="rId2">
-            <a:extLst>
-              <a:ext uri="{28A0092B-C50C-407E-A947-70E740481C1C}">
-                <a14:useLocalDpi xmlns:a14="http://schemas.microsoft.com/office/drawing/2010/main" val="0"/>
-              </a:ext>
-            </a:extLst>
-          </a:blip>
-          <a:stretch>
-            <a:fillRect/>
-          </a:stretch>
-        </p:blipFill>
-        <p:spPr>
-          <a:xfrm>
-            <a:off x="0" y="857"/>
-            <a:ext cx="12192000" cy="6856286"/>
-          </a:xfrm>
-          <a:prstGeom prst="rect">
-            <a:avLst/>
-          </a:prstGeom>
-        </p:spPr>
-      </p:pic>
-    </p:spTree>
-    <p:extLst>
-      <p:ext uri="{BB962C8B-B14F-4D97-AF65-F5344CB8AC3E}">
-        <p14:creationId xmlns:p14="http://schemas.microsoft.com/office/powerpoint/2010/main" val="3008503818"/>
-      </p:ext>
-    </p:extLst>
-  </p:cSld>
-  <p:clrMapOvr>
-    <a:masterClrMapping/>
-  </p:clrMapOvr>
-  <mc:AlternateContent xmlns:mc="http://schemas.openxmlformats.org/markup-compatibility/2006" xmlns:p14="http://schemas.microsoft.com/office/powerpoint/2010/main">
-    <mc:Choice Requires="p14">
-      <p:transition spd="med" p14:dur="700">
-        <p:fade/>
-      </p:transition>
-    </mc:Choice>
-    <mc:Fallback xmlns="">
-      <p:transition spd="med">
+    <mc:Fallback>
+      <p:transition spd="slow">
         <p:fade/>
       </p:transition>
     </mc:Fallback>
@@ -6111,10 +8365,10 @@
       </p:grpSpPr>
       <p:pic>
         <p:nvPicPr>
-          <p:cNvPr id="11" name="Imagem 10">
-            <a:extLst>
-              <a:ext uri="{FF2B5EF4-FFF2-40B4-BE49-F238E27FC236}">
-                <a16:creationId xmlns:a16="http://schemas.microsoft.com/office/drawing/2014/main" id="{1BA5CE3A-4649-484C-A539-F7FBE27E7525}"/>
+          <p:cNvPr id="5" name="Imagem 4" descr="Uma imagem contendo texto, mapa&#10;&#10;Descrição gerada com muito alta confiança">
+            <a:extLst>
+              <a:ext uri="{FF2B5EF4-FFF2-40B4-BE49-F238E27FC236}">
+                <a16:creationId xmlns:a16="http://schemas.microsoft.com/office/drawing/2014/main" id="{5345386B-DCF3-4359-8130-6872DDCB2390}"/>
               </a:ext>
             </a:extLst>
           </p:cNvPr>
@@ -6137,7 +8391,7 @@
         </p:blipFill>
         <p:spPr>
           <a:xfrm>
-            <a:off x="0" y="0"/>
+            <a:off x="0" y="857"/>
             <a:ext cx="12192000" cy="6856286"/>
           </a:xfrm>
           <a:prstGeom prst="rect">
@@ -6145,246 +8399,28 @@
           </a:prstGeom>
         </p:spPr>
       </p:pic>
-      <p:pic>
-        <p:nvPicPr>
-          <p:cNvPr id="3" name="Imagem 2" descr="Uma imagem contendo texto, mapa&#10;&#10;Descrição gerada com muito alta confiança">
-            <a:extLst>
-              <a:ext uri="{FF2B5EF4-FFF2-40B4-BE49-F238E27FC236}">
-                <a16:creationId xmlns:a16="http://schemas.microsoft.com/office/drawing/2014/main" id="{2661C664-2AF1-44FE-8E99-F46451549460}"/>
-              </a:ext>
-            </a:extLst>
-          </p:cNvPr>
-          <p:cNvPicPr>
-            <a:picLocks noChangeAspect="1"/>
-          </p:cNvPicPr>
-          <p:nvPr/>
-        </p:nvPicPr>
-        <p:blipFill>
-          <a:blip r:embed="rId3">
-            <a:extLst>
-              <a:ext uri="{28A0092B-C50C-407E-A947-70E740481C1C}">
-                <a14:useLocalDpi xmlns:a14="http://schemas.microsoft.com/office/drawing/2010/main" val="0"/>
-              </a:ext>
-            </a:extLst>
-          </a:blip>
-          <a:stretch>
-            <a:fillRect/>
-          </a:stretch>
-        </p:blipFill>
-        <p:spPr>
-          <a:xfrm>
-            <a:off x="3935933" y="204416"/>
-            <a:ext cx="8084045" cy="6447453"/>
-          </a:xfrm>
-          <a:prstGeom prst="rect">
-            <a:avLst/>
-          </a:prstGeom>
-          <a:ln>
-            <a:noFill/>
-          </a:ln>
-          <a:effectLst>
-            <a:outerShdw blurRad="292100" dist="139700" dir="2700000" algn="tl" rotWithShape="0">
-              <a:srgbClr val="333333">
-                <a:alpha val="65000"/>
-              </a:srgbClr>
-            </a:outerShdw>
-          </a:effectLst>
-        </p:spPr>
-      </p:pic>
-      <p:sp>
-        <p:nvSpPr>
-          <p:cNvPr id="6" name="CaixaDeTexto 5">
-            <a:extLst>
-              <a:ext uri="{FF2B5EF4-FFF2-40B4-BE49-F238E27FC236}">
-                <a16:creationId xmlns:a16="http://schemas.microsoft.com/office/drawing/2014/main" id="{0CDDDA0A-7545-41CF-99D3-777DFDFEB6CB}"/>
-              </a:ext>
-            </a:extLst>
-          </p:cNvPr>
-          <p:cNvSpPr txBox="1"/>
-          <p:nvPr/>
-        </p:nvSpPr>
-        <p:spPr>
-          <a:xfrm>
-            <a:off x="-1203721" y="2518150"/>
-            <a:ext cx="6189551" cy="1200329"/>
-          </a:xfrm>
-          <a:prstGeom prst="rect">
-            <a:avLst/>
-          </a:prstGeom>
-          <a:noFill/>
-        </p:spPr>
-        <p:txBody>
-          <a:bodyPr wrap="square" rtlCol="0">
-            <a:spAutoFit/>
-          </a:bodyPr>
-          <a:lstStyle/>
-          <a:p>
-            <a:pPr algn="ctr"/>
-            <a:r>
-              <a:rPr lang="pt-BR" sz="7200" b="1" dirty="0">
-                <a:latin typeface="Roboto Th" pitchFamily="2" charset="0"/>
-                <a:ea typeface="Roboto Th" pitchFamily="2" charset="0"/>
-              </a:rPr>
-              <a:t>Interface</a:t>
-            </a:r>
-            <a:endParaRPr lang="pt-BR" b="1" dirty="0">
-              <a:latin typeface="Roboto Th" pitchFamily="2" charset="0"/>
-              <a:ea typeface="Roboto Th" pitchFamily="2" charset="0"/>
-            </a:endParaRPr>
-          </a:p>
-        </p:txBody>
-      </p:sp>
     </p:spTree>
     <p:extLst>
       <p:ext uri="{BB962C8B-B14F-4D97-AF65-F5344CB8AC3E}">
-        <p14:creationId xmlns:p14="http://schemas.microsoft.com/office/powerpoint/2010/main" val="2451225944"/>
+        <p14:creationId xmlns:p14="http://schemas.microsoft.com/office/powerpoint/2010/main" val="3008503818"/>
       </p:ext>
     </p:extLst>
   </p:cSld>
   <p:clrMapOvr>
     <a:masterClrMapping/>
   </p:clrMapOvr>
-  <mc:AlternateContent xmlns:mc="http://schemas.openxmlformats.org/markup-compatibility/2006" xmlns:p14="http://schemas.microsoft.com/office/powerpoint/2010/main">
-    <mc:Choice Requires="p14">
-      <p:transition spd="med" p14:dur="700">
-        <p:fade/>
+  <mc:AlternateContent xmlns:mc="http://schemas.openxmlformats.org/markup-compatibility/2006">
+    <mc:Choice xmlns:p159="http://schemas.microsoft.com/office/powerpoint/2015/09/main" Requires="p159">
+      <p:transition xmlns:p14="http://schemas.microsoft.com/office/powerpoint/2010/main" spd="slow" p14:dur="2000">
+        <p159:morph option="byObject"/>
       </p:transition>
     </mc:Choice>
-    <mc:Fallback xmlns="">
-      <p:transition spd="med">
+    <mc:Fallback>
+      <p:transition spd="slow">
         <p:fade/>
       </p:transition>
     </mc:Fallback>
   </mc:AlternateContent>
-  <p:timing>
-    <p:tnLst>
-      <p:par>
-        <p:cTn id="1" dur="indefinite" restart="never" nodeType="tmRoot">
-          <p:childTnLst>
-            <p:seq concurrent="1" nextAc="seek">
-              <p:cTn id="2" dur="indefinite" nodeType="mainSeq">
-                <p:childTnLst>
-                  <p:par>
-                    <p:cTn id="3" fill="hold">
-                      <p:stCondLst>
-                        <p:cond delay="indefinite"/>
-                      </p:stCondLst>
-                      <p:childTnLst>
-                        <p:par>
-                          <p:cTn id="4" fill="hold">
-                            <p:stCondLst>
-                              <p:cond delay="0"/>
-                            </p:stCondLst>
-                            <p:childTnLst>
-                              <p:par>
-                                <p:cTn id="5" presetID="42" presetClass="entr" presetSubtype="0" fill="hold" nodeType="clickEffect">
-                                  <p:stCondLst>
-                                    <p:cond delay="0"/>
-                                  </p:stCondLst>
-                                  <p:childTnLst>
-                                    <p:set>
-                                      <p:cBhvr>
-                                        <p:cTn id="6" dur="1" fill="hold">
-                                          <p:stCondLst>
-                                            <p:cond delay="0"/>
-                                          </p:stCondLst>
-                                        </p:cTn>
-                                        <p:tgtEl>
-                                          <p:spTgt spid="3"/>
-                                        </p:tgtEl>
-                                        <p:attrNameLst>
-                                          <p:attrName>style.visibility</p:attrName>
-                                        </p:attrNameLst>
-                                      </p:cBhvr>
-                                      <p:to>
-                                        <p:strVal val="visible"/>
-                                      </p:to>
-                                    </p:set>
-                                    <p:animEffect transition="in" filter="fade">
-                                      <p:cBhvr>
-                                        <p:cTn id="7" dur="1000"/>
-                                        <p:tgtEl>
-                                          <p:spTgt spid="3"/>
-                                        </p:tgtEl>
-                                      </p:cBhvr>
-                                    </p:animEffect>
-                                    <p:anim calcmode="lin" valueType="num">
-                                      <p:cBhvr>
-                                        <p:cTn id="8" dur="1000" fill="hold"/>
-                                        <p:tgtEl>
-                                          <p:spTgt spid="3"/>
-                                        </p:tgtEl>
-                                        <p:attrNameLst>
-                                          <p:attrName>ppt_x</p:attrName>
-                                        </p:attrNameLst>
-                                      </p:cBhvr>
-                                      <p:tavLst>
-                                        <p:tav tm="0">
-                                          <p:val>
-                                            <p:strVal val="#ppt_x"/>
-                                          </p:val>
-                                        </p:tav>
-                                        <p:tav tm="100000">
-                                          <p:val>
-                                            <p:strVal val="#ppt_x"/>
-                                          </p:val>
-                                        </p:tav>
-                                      </p:tavLst>
-                                    </p:anim>
-                                    <p:anim calcmode="lin" valueType="num">
-                                      <p:cBhvr>
-                                        <p:cTn id="9" dur="1000" fill="hold"/>
-                                        <p:tgtEl>
-                                          <p:spTgt spid="3"/>
-                                        </p:tgtEl>
-                                        <p:attrNameLst>
-                                          <p:attrName>ppt_y</p:attrName>
-                                        </p:attrNameLst>
-                                      </p:cBhvr>
-                                      <p:tavLst>
-                                        <p:tav tm="0">
-                                          <p:val>
-                                            <p:strVal val="#ppt_y+.1"/>
-                                          </p:val>
-                                        </p:tav>
-                                        <p:tav tm="100000">
-                                          <p:val>
-                                            <p:strVal val="#ppt_y"/>
-                                          </p:val>
-                                        </p:tav>
-                                      </p:tavLst>
-                                    </p:anim>
-                                  </p:childTnLst>
-                                </p:cTn>
-                              </p:par>
-                            </p:childTnLst>
-                          </p:cTn>
-                        </p:par>
-                      </p:childTnLst>
-                    </p:cTn>
-                  </p:par>
-                </p:childTnLst>
-              </p:cTn>
-              <p:prevCondLst>
-                <p:cond evt="onPrev" delay="0">
-                  <p:tgtEl>
-                    <p:sldTgt/>
-                  </p:tgtEl>
-                </p:cond>
-              </p:prevCondLst>
-              <p:nextCondLst>
-                <p:cond evt="onNext" delay="0">
-                  <p:tgtEl>
-                    <p:sldTgt/>
-                  </p:tgtEl>
-                </p:cond>
-              </p:nextCondLst>
-            </p:seq>
-          </p:childTnLst>
-        </p:cTn>
-      </p:par>
-    </p:tnLst>
-  </p:timing>
 </p:sld>
 </file>
 

</xml_diff>